<commit_message>
circuit design for camera setup and new reapp analysis
</commit_message>
<xml_diff>
--- a/kinematic presentations/updated best 2 circuits.pptx
+++ b/kinematic presentations/updated best 2 circuits.pptx
@@ -13,6 +13,7 @@
     <p:sldId id="257" r:id="rId7"/>
     <p:sldId id="258" r:id="rId8"/>
     <p:sldId id="264" r:id="rId9"/>
+    <p:sldId id="265" r:id="rId10"/>
   </p:sldIdLst>
   <p:sldSz cx="12192000" cy="6858000"/>
   <p:notesSz cx="6858000" cy="9144000"/>
@@ -119,12 +120,20 @@
 </p:presentation>
 </file>
 
+<file path=ppt/revisionInfo.xml><?xml version="1.0" encoding="utf-8"?>
+<p1510:revInfo xmlns:a="http://schemas.openxmlformats.org/drawingml/2006/main" xmlns:r="http://schemas.openxmlformats.org/officeDocument/2006/relationships" xmlns:p1510="http://schemas.microsoft.com/office/powerpoint/2015/10/main">
+  <p1510:revLst>
+    <p1510:client id="{F6B069B4-03DA-4A27-B6F7-AA801EF70CFF}" v="68" dt="2025-05-14T19:42:16.299"/>
+  </p1510:revLst>
+</p1510:revInfo>
+</file>
+
 <file path=ppt/changesInfos/changesInfo1.xml><?xml version="1.0" encoding="utf-8"?>
 <pc:chgInfo xmlns:a="http://schemas.openxmlformats.org/drawingml/2006/main" xmlns:r="http://schemas.openxmlformats.org/officeDocument/2006/relationships" xmlns:ac="http://schemas.microsoft.com/office/drawing/2013/main/command" xmlns:pc="http://schemas.microsoft.com/office/powerpoint/2013/main/command">
   <pc:docChgLst>
     <pc:chgData name="Oppenheim, Tomas" userId="7bbdd6b4-1f3d-4fdd-ac21-d8c716941374" providerId="ADAL" clId="{F6B069B4-03DA-4A27-B6F7-AA801EF70CFF}"/>
-    <pc:docChg chg="custSel modSld sldOrd">
-      <pc:chgData name="Oppenheim, Tomas" userId="7bbdd6b4-1f3d-4fdd-ac21-d8c716941374" providerId="ADAL" clId="{F6B069B4-03DA-4A27-B6F7-AA801EF70CFF}" dt="2025-05-12T17:57:15.038" v="15"/>
+    <pc:docChg chg="undo custSel addSld modSld sldOrd">
+      <pc:chgData name="Oppenheim, Tomas" userId="7bbdd6b4-1f3d-4fdd-ac21-d8c716941374" providerId="ADAL" clId="{F6B069B4-03DA-4A27-B6F7-AA801EF70CFF}" dt="2025-05-14T19:42:34.347" v="606" actId="1076"/>
       <pc:docMkLst>
         <pc:docMk/>
       </pc:docMkLst>
@@ -166,6 +175,717 @@
           <pc:sldMk cId="3099770171" sldId="264"/>
         </pc:sldMkLst>
       </pc:sldChg>
+      <pc:sldChg chg="addSp delSp modSp new mod ord">
+        <pc:chgData name="Oppenheim, Tomas" userId="7bbdd6b4-1f3d-4fdd-ac21-d8c716941374" providerId="ADAL" clId="{F6B069B4-03DA-4A27-B6F7-AA801EF70CFF}" dt="2025-05-14T19:42:34.347" v="606" actId="1076"/>
+        <pc:sldMkLst>
+          <pc:docMk/>
+          <pc:sldMk cId="876017896" sldId="265"/>
+        </pc:sldMkLst>
+        <pc:spChg chg="del">
+          <ac:chgData name="Oppenheim, Tomas" userId="7bbdd6b4-1f3d-4fdd-ac21-d8c716941374" providerId="ADAL" clId="{F6B069B4-03DA-4A27-B6F7-AA801EF70CFF}" dt="2025-05-14T18:57:23.895" v="17" actId="478"/>
+          <ac:spMkLst>
+            <pc:docMk/>
+            <pc:sldMk cId="876017896" sldId="265"/>
+            <ac:spMk id="2" creationId="{EB663978-F970-8274-6EF0-5D5F0136B4BD}"/>
+          </ac:spMkLst>
+        </pc:spChg>
+        <pc:spChg chg="del">
+          <ac:chgData name="Oppenheim, Tomas" userId="7bbdd6b4-1f3d-4fdd-ac21-d8c716941374" providerId="ADAL" clId="{F6B069B4-03DA-4A27-B6F7-AA801EF70CFF}" dt="2025-05-14T18:57:25.041" v="18" actId="478"/>
+          <ac:spMkLst>
+            <pc:docMk/>
+            <pc:sldMk cId="876017896" sldId="265"/>
+            <ac:spMk id="3" creationId="{E15453DC-6EAB-FCA1-60CE-20CA5A34E1E4}"/>
+          </ac:spMkLst>
+        </pc:spChg>
+        <pc:spChg chg="add mod">
+          <ac:chgData name="Oppenheim, Tomas" userId="7bbdd6b4-1f3d-4fdd-ac21-d8c716941374" providerId="ADAL" clId="{F6B069B4-03DA-4A27-B6F7-AA801EF70CFF}" dt="2025-05-14T19:28:11.299" v="470" actId="14100"/>
+          <ac:spMkLst>
+            <pc:docMk/>
+            <pc:sldMk cId="876017896" sldId="265"/>
+            <ac:spMk id="4" creationId="{7B2058FD-B1A9-4F18-6FF1-92BC1425BF2B}"/>
+          </ac:spMkLst>
+        </pc:spChg>
+        <pc:spChg chg="add mod">
+          <ac:chgData name="Oppenheim, Tomas" userId="7bbdd6b4-1f3d-4fdd-ac21-d8c716941374" providerId="ADAL" clId="{F6B069B4-03DA-4A27-B6F7-AA801EF70CFF}" dt="2025-05-14T18:59:59.957" v="78" actId="1076"/>
+          <ac:spMkLst>
+            <pc:docMk/>
+            <pc:sldMk cId="876017896" sldId="265"/>
+            <ac:spMk id="5" creationId="{46256668-5A6D-0153-A1F3-5957E20024CD}"/>
+          </ac:spMkLst>
+        </pc:spChg>
+        <pc:spChg chg="add mod">
+          <ac:chgData name="Oppenheim, Tomas" userId="7bbdd6b4-1f3d-4fdd-ac21-d8c716941374" providerId="ADAL" clId="{F6B069B4-03DA-4A27-B6F7-AA801EF70CFF}" dt="2025-05-14T19:07:24.107" v="203" actId="1076"/>
+          <ac:spMkLst>
+            <pc:docMk/>
+            <pc:sldMk cId="876017896" sldId="265"/>
+            <ac:spMk id="7" creationId="{5E9AAF7A-6242-F9C4-B673-DE439C196A32}"/>
+          </ac:spMkLst>
+        </pc:spChg>
+        <pc:spChg chg="add mod">
+          <ac:chgData name="Oppenheim, Tomas" userId="7bbdd6b4-1f3d-4fdd-ac21-d8c716941374" providerId="ADAL" clId="{F6B069B4-03DA-4A27-B6F7-AA801EF70CFF}" dt="2025-05-14T19:03:07.655" v="135" actId="1076"/>
+          <ac:spMkLst>
+            <pc:docMk/>
+            <pc:sldMk cId="876017896" sldId="265"/>
+            <ac:spMk id="8" creationId="{E7BE750F-370B-17C3-BB6C-3B69FBC97E9A}"/>
+          </ac:spMkLst>
+        </pc:spChg>
+        <pc:spChg chg="add mod">
+          <ac:chgData name="Oppenheim, Tomas" userId="7bbdd6b4-1f3d-4fdd-ac21-d8c716941374" providerId="ADAL" clId="{F6B069B4-03DA-4A27-B6F7-AA801EF70CFF}" dt="2025-05-14T19:00:21.326" v="86" actId="1076"/>
+          <ac:spMkLst>
+            <pc:docMk/>
+            <pc:sldMk cId="876017896" sldId="265"/>
+            <ac:spMk id="17" creationId="{98495B46-5D1F-90C4-D045-A7031EEAB529}"/>
+          </ac:spMkLst>
+        </pc:spChg>
+        <pc:spChg chg="add mod">
+          <ac:chgData name="Oppenheim, Tomas" userId="7bbdd6b4-1f3d-4fdd-ac21-d8c716941374" providerId="ADAL" clId="{F6B069B4-03DA-4A27-B6F7-AA801EF70CFF}" dt="2025-05-14T19:00:24.259" v="88" actId="1076"/>
+          <ac:spMkLst>
+            <pc:docMk/>
+            <pc:sldMk cId="876017896" sldId="265"/>
+            <ac:spMk id="18" creationId="{61C38F38-B9FC-6A1E-3488-83AAE881D05F}"/>
+          </ac:spMkLst>
+        </pc:spChg>
+        <pc:spChg chg="add mod">
+          <ac:chgData name="Oppenheim, Tomas" userId="7bbdd6b4-1f3d-4fdd-ac21-d8c716941374" providerId="ADAL" clId="{F6B069B4-03DA-4A27-B6F7-AA801EF70CFF}" dt="2025-05-14T19:00:28.295" v="90" actId="1076"/>
+          <ac:spMkLst>
+            <pc:docMk/>
+            <pc:sldMk cId="876017896" sldId="265"/>
+            <ac:spMk id="19" creationId="{E557B6B8-0733-8F05-F8C7-3249986E5AE4}"/>
+          </ac:spMkLst>
+        </pc:spChg>
+        <pc:spChg chg="add mod">
+          <ac:chgData name="Oppenheim, Tomas" userId="7bbdd6b4-1f3d-4fdd-ac21-d8c716941374" providerId="ADAL" clId="{F6B069B4-03DA-4A27-B6F7-AA801EF70CFF}" dt="2025-05-14T19:23:58.437" v="419" actId="1076"/>
+          <ac:spMkLst>
+            <pc:docMk/>
+            <pc:sldMk cId="876017896" sldId="265"/>
+            <ac:spMk id="20" creationId="{AD57BAA8-8B22-3345-E881-735ECAFC098F}"/>
+          </ac:spMkLst>
+        </pc:spChg>
+        <pc:spChg chg="add mod">
+          <ac:chgData name="Oppenheim, Tomas" userId="7bbdd6b4-1f3d-4fdd-ac21-d8c716941374" providerId="ADAL" clId="{F6B069B4-03DA-4A27-B6F7-AA801EF70CFF}" dt="2025-05-14T19:02:40.187" v="104" actId="207"/>
+          <ac:spMkLst>
+            <pc:docMk/>
+            <pc:sldMk cId="876017896" sldId="265"/>
+            <ac:spMk id="25" creationId="{440E9DED-3FB1-8533-BE9E-FBF152ECDE62}"/>
+          </ac:spMkLst>
+        </pc:spChg>
+        <pc:spChg chg="add mod">
+          <ac:chgData name="Oppenheim, Tomas" userId="7bbdd6b4-1f3d-4fdd-ac21-d8c716941374" providerId="ADAL" clId="{F6B069B4-03DA-4A27-B6F7-AA801EF70CFF}" dt="2025-05-14T19:02:45.097" v="107" actId="1076"/>
+          <ac:spMkLst>
+            <pc:docMk/>
+            <pc:sldMk cId="876017896" sldId="265"/>
+            <ac:spMk id="26" creationId="{A7DE899E-595E-D35A-7720-E0FAF5C1CB95}"/>
+          </ac:spMkLst>
+        </pc:spChg>
+        <pc:spChg chg="add mod">
+          <ac:chgData name="Oppenheim, Tomas" userId="7bbdd6b4-1f3d-4fdd-ac21-d8c716941374" providerId="ADAL" clId="{F6B069B4-03DA-4A27-B6F7-AA801EF70CFF}" dt="2025-05-14T19:02:47.739" v="109" actId="1076"/>
+          <ac:spMkLst>
+            <pc:docMk/>
+            <pc:sldMk cId="876017896" sldId="265"/>
+            <ac:spMk id="27" creationId="{EE7CDB47-CCE5-C8E4-0468-A0B2783853B5}"/>
+          </ac:spMkLst>
+        </pc:spChg>
+        <pc:spChg chg="add mod">
+          <ac:chgData name="Oppenheim, Tomas" userId="7bbdd6b4-1f3d-4fdd-ac21-d8c716941374" providerId="ADAL" clId="{F6B069B4-03DA-4A27-B6F7-AA801EF70CFF}" dt="2025-05-14T19:03:01.485" v="134" actId="1036"/>
+          <ac:spMkLst>
+            <pc:docMk/>
+            <pc:sldMk cId="876017896" sldId="265"/>
+            <ac:spMk id="28" creationId="{E78FAAD9-7278-DD08-A6FB-5A7734CA7CE1}"/>
+          </ac:spMkLst>
+        </pc:spChg>
+        <pc:spChg chg="add mod">
+          <ac:chgData name="Oppenheim, Tomas" userId="7bbdd6b4-1f3d-4fdd-ac21-d8c716941374" providerId="ADAL" clId="{F6B069B4-03DA-4A27-B6F7-AA801EF70CFF}" dt="2025-05-14T19:18:28.494" v="253" actId="1036"/>
+          <ac:spMkLst>
+            <pc:docMk/>
+            <pc:sldMk cId="876017896" sldId="265"/>
+            <ac:spMk id="29" creationId="{6136B673-7AB2-366F-3F7D-D822AB8998EA}"/>
+          </ac:spMkLst>
+        </pc:spChg>
+        <pc:spChg chg="add mod">
+          <ac:chgData name="Oppenheim, Tomas" userId="7bbdd6b4-1f3d-4fdd-ac21-d8c716941374" providerId="ADAL" clId="{F6B069B4-03DA-4A27-B6F7-AA801EF70CFF}" dt="2025-05-14T19:18:31.549" v="262" actId="1036"/>
+          <ac:spMkLst>
+            <pc:docMk/>
+            <pc:sldMk cId="876017896" sldId="265"/>
+            <ac:spMk id="30" creationId="{4F85BC04-D980-6536-443C-A6174292F5E8}"/>
+          </ac:spMkLst>
+        </pc:spChg>
+        <pc:spChg chg="add mod">
+          <ac:chgData name="Oppenheim, Tomas" userId="7bbdd6b4-1f3d-4fdd-ac21-d8c716941374" providerId="ADAL" clId="{F6B069B4-03DA-4A27-B6F7-AA801EF70CFF}" dt="2025-05-14T19:18:35.617" v="276" actId="1036"/>
+          <ac:spMkLst>
+            <pc:docMk/>
+            <pc:sldMk cId="876017896" sldId="265"/>
+            <ac:spMk id="31" creationId="{A41D649C-4013-89C3-205B-4C73866AB562}"/>
+          </ac:spMkLst>
+        </pc:spChg>
+        <pc:spChg chg="add mod">
+          <ac:chgData name="Oppenheim, Tomas" userId="7bbdd6b4-1f3d-4fdd-ac21-d8c716941374" providerId="ADAL" clId="{F6B069B4-03DA-4A27-B6F7-AA801EF70CFF}" dt="2025-05-14T19:18:41.267" v="298" actId="1036"/>
+          <ac:spMkLst>
+            <pc:docMk/>
+            <pc:sldMk cId="876017896" sldId="265"/>
+            <ac:spMk id="32" creationId="{A0BDFFDE-826B-B762-A381-146F43F80036}"/>
+          </ac:spMkLst>
+        </pc:spChg>
+        <pc:spChg chg="add mod">
+          <ac:chgData name="Oppenheim, Tomas" userId="7bbdd6b4-1f3d-4fdd-ac21-d8c716941374" providerId="ADAL" clId="{F6B069B4-03DA-4A27-B6F7-AA801EF70CFF}" dt="2025-05-14T19:21:22.044" v="372" actId="14100"/>
+          <ac:spMkLst>
+            <pc:docMk/>
+            <pc:sldMk cId="876017896" sldId="265"/>
+            <ac:spMk id="33" creationId="{AF5328B2-8CA4-E823-AD74-4662F4878A55}"/>
+          </ac:spMkLst>
+        </pc:spChg>
+        <pc:spChg chg="add del mod">
+          <ac:chgData name="Oppenheim, Tomas" userId="7bbdd6b4-1f3d-4fdd-ac21-d8c716941374" providerId="ADAL" clId="{F6B069B4-03DA-4A27-B6F7-AA801EF70CFF}" dt="2025-05-14T19:22:35.700" v="394" actId="478"/>
+          <ac:spMkLst>
+            <pc:docMk/>
+            <pc:sldMk cId="876017896" sldId="265"/>
+            <ac:spMk id="34" creationId="{239DC4EA-04E1-98CA-4A4C-A50AF793CAAA}"/>
+          </ac:spMkLst>
+        </pc:spChg>
+        <pc:spChg chg="add mod">
+          <ac:chgData name="Oppenheim, Tomas" userId="7bbdd6b4-1f3d-4fdd-ac21-d8c716941374" providerId="ADAL" clId="{F6B069B4-03DA-4A27-B6F7-AA801EF70CFF}" dt="2025-05-14T19:20:10.985" v="338" actId="20577"/>
+          <ac:spMkLst>
+            <pc:docMk/>
+            <pc:sldMk cId="876017896" sldId="265"/>
+            <ac:spMk id="36" creationId="{0B203E25-5768-63BD-52BF-38BCEE8E0541}"/>
+          </ac:spMkLst>
+        </pc:spChg>
+        <pc:spChg chg="add del mod">
+          <ac:chgData name="Oppenheim, Tomas" userId="7bbdd6b4-1f3d-4fdd-ac21-d8c716941374" providerId="ADAL" clId="{F6B069B4-03DA-4A27-B6F7-AA801EF70CFF}" dt="2025-05-14T19:06:19.903" v="185" actId="478"/>
+          <ac:spMkLst>
+            <pc:docMk/>
+            <pc:sldMk cId="876017896" sldId="265"/>
+            <ac:spMk id="37" creationId="{5D9984D4-05B9-82F8-F327-D8DBAAB2044F}"/>
+          </ac:spMkLst>
+        </pc:spChg>
+        <pc:spChg chg="add del mod">
+          <ac:chgData name="Oppenheim, Tomas" userId="7bbdd6b4-1f3d-4fdd-ac21-d8c716941374" providerId="ADAL" clId="{F6B069B4-03DA-4A27-B6F7-AA801EF70CFF}" dt="2025-05-14T19:06:21.575" v="186" actId="478"/>
+          <ac:spMkLst>
+            <pc:docMk/>
+            <pc:sldMk cId="876017896" sldId="265"/>
+            <ac:spMk id="38" creationId="{A3EB9561-DEE6-75EB-75E3-08FA63B5D5AA}"/>
+          </ac:spMkLst>
+        </pc:spChg>
+        <pc:spChg chg="add del mod">
+          <ac:chgData name="Oppenheim, Tomas" userId="7bbdd6b4-1f3d-4fdd-ac21-d8c716941374" providerId="ADAL" clId="{F6B069B4-03DA-4A27-B6F7-AA801EF70CFF}" dt="2025-05-14T19:06:22.958" v="187" actId="478"/>
+          <ac:spMkLst>
+            <pc:docMk/>
+            <pc:sldMk cId="876017896" sldId="265"/>
+            <ac:spMk id="39" creationId="{19ADC342-588C-165E-6F70-31C0A9555C3E}"/>
+          </ac:spMkLst>
+        </pc:spChg>
+        <pc:spChg chg="add mod">
+          <ac:chgData name="Oppenheim, Tomas" userId="7bbdd6b4-1f3d-4fdd-ac21-d8c716941374" providerId="ADAL" clId="{F6B069B4-03DA-4A27-B6F7-AA801EF70CFF}" dt="2025-05-14T19:06:44.773" v="196" actId="1076"/>
+          <ac:spMkLst>
+            <pc:docMk/>
+            <pc:sldMk cId="876017896" sldId="265"/>
+            <ac:spMk id="40" creationId="{42BCACE0-6AD3-C4B3-6017-1CCC02FB63A9}"/>
+          </ac:spMkLst>
+        </pc:spChg>
+        <pc:spChg chg="add mod">
+          <ac:chgData name="Oppenheim, Tomas" userId="7bbdd6b4-1f3d-4fdd-ac21-d8c716941374" providerId="ADAL" clId="{F6B069B4-03DA-4A27-B6F7-AA801EF70CFF}" dt="2025-05-14T19:20:14.773" v="344" actId="20577"/>
+          <ac:spMkLst>
+            <pc:docMk/>
+            <pc:sldMk cId="876017896" sldId="265"/>
+            <ac:spMk id="41" creationId="{E52AEF33-8944-BBA7-B6CA-F1DB6CBA0343}"/>
+          </ac:spMkLst>
+        </pc:spChg>
+        <pc:spChg chg="add mod">
+          <ac:chgData name="Oppenheim, Tomas" userId="7bbdd6b4-1f3d-4fdd-ac21-d8c716941374" providerId="ADAL" clId="{F6B069B4-03DA-4A27-B6F7-AA801EF70CFF}" dt="2025-05-14T19:20:18.026" v="346" actId="20577"/>
+          <ac:spMkLst>
+            <pc:docMk/>
+            <pc:sldMk cId="876017896" sldId="265"/>
+            <ac:spMk id="42" creationId="{DF7DC70D-B8BD-A7A0-C6E7-AF9273BFE62B}"/>
+          </ac:spMkLst>
+        </pc:spChg>
+        <pc:spChg chg="add mod">
+          <ac:chgData name="Oppenheim, Tomas" userId="7bbdd6b4-1f3d-4fdd-ac21-d8c716941374" providerId="ADAL" clId="{F6B069B4-03DA-4A27-B6F7-AA801EF70CFF}" dt="2025-05-14T19:20:20.907" v="348" actId="20577"/>
+          <ac:spMkLst>
+            <pc:docMk/>
+            <pc:sldMk cId="876017896" sldId="265"/>
+            <ac:spMk id="43" creationId="{D0875418-C307-4A5B-84D3-63243FA93AF2}"/>
+          </ac:spMkLst>
+        </pc:spChg>
+        <pc:spChg chg="add mod">
+          <ac:chgData name="Oppenheim, Tomas" userId="7bbdd6b4-1f3d-4fdd-ac21-d8c716941374" providerId="ADAL" clId="{F6B069B4-03DA-4A27-B6F7-AA801EF70CFF}" dt="2025-05-14T19:06:51.538" v="198" actId="1076"/>
+          <ac:spMkLst>
+            <pc:docMk/>
+            <pc:sldMk cId="876017896" sldId="265"/>
+            <ac:spMk id="44" creationId="{5BCAA173-7545-461B-62C3-909788B5C86D}"/>
+          </ac:spMkLst>
+        </pc:spChg>
+        <pc:spChg chg="add mod">
+          <ac:chgData name="Oppenheim, Tomas" userId="7bbdd6b4-1f3d-4fdd-ac21-d8c716941374" providerId="ADAL" clId="{F6B069B4-03DA-4A27-B6F7-AA801EF70CFF}" dt="2025-05-14T19:06:55.127" v="200" actId="1076"/>
+          <ac:spMkLst>
+            <pc:docMk/>
+            <pc:sldMk cId="876017896" sldId="265"/>
+            <ac:spMk id="45" creationId="{39210EB9-73E1-78B8-5E21-3C25800571B6}"/>
+          </ac:spMkLst>
+        </pc:spChg>
+        <pc:spChg chg="add mod">
+          <ac:chgData name="Oppenheim, Tomas" userId="7bbdd6b4-1f3d-4fdd-ac21-d8c716941374" providerId="ADAL" clId="{F6B069B4-03DA-4A27-B6F7-AA801EF70CFF}" dt="2025-05-14T19:07:01.072" v="202" actId="1076"/>
+          <ac:spMkLst>
+            <pc:docMk/>
+            <pc:sldMk cId="876017896" sldId="265"/>
+            <ac:spMk id="46" creationId="{6D36B43E-AA2C-9595-842F-0C91086E6643}"/>
+          </ac:spMkLst>
+        </pc:spChg>
+        <pc:spChg chg="add mod">
+          <ac:chgData name="Oppenheim, Tomas" userId="7bbdd6b4-1f3d-4fdd-ac21-d8c716941374" providerId="ADAL" clId="{F6B069B4-03DA-4A27-B6F7-AA801EF70CFF}" dt="2025-05-14T19:18:46.325" v="299" actId="1076"/>
+          <ac:spMkLst>
+            <pc:docMk/>
+            <pc:sldMk cId="876017896" sldId="265"/>
+            <ac:spMk id="47" creationId="{297A55A5-F61F-D594-EE84-9E0B2707FC3C}"/>
+          </ac:spMkLst>
+        </pc:spChg>
+        <pc:spChg chg="add mod">
+          <ac:chgData name="Oppenheim, Tomas" userId="7bbdd6b4-1f3d-4fdd-ac21-d8c716941374" providerId="ADAL" clId="{F6B069B4-03DA-4A27-B6F7-AA801EF70CFF}" dt="2025-05-14T19:07:38.509" v="211" actId="1076"/>
+          <ac:spMkLst>
+            <pc:docMk/>
+            <pc:sldMk cId="876017896" sldId="265"/>
+            <ac:spMk id="48" creationId="{10571970-6DA9-225E-8834-A3EE88104997}"/>
+          </ac:spMkLst>
+        </pc:spChg>
+        <pc:spChg chg="add mod">
+          <ac:chgData name="Oppenheim, Tomas" userId="7bbdd6b4-1f3d-4fdd-ac21-d8c716941374" providerId="ADAL" clId="{F6B069B4-03DA-4A27-B6F7-AA801EF70CFF}" dt="2025-05-14T19:07:42.338" v="213" actId="1076"/>
+          <ac:spMkLst>
+            <pc:docMk/>
+            <pc:sldMk cId="876017896" sldId="265"/>
+            <ac:spMk id="49" creationId="{A4898651-6771-3C0A-50A0-A3A5E5C58855}"/>
+          </ac:spMkLst>
+        </pc:spChg>
+        <pc:spChg chg="add mod">
+          <ac:chgData name="Oppenheim, Tomas" userId="7bbdd6b4-1f3d-4fdd-ac21-d8c716941374" providerId="ADAL" clId="{F6B069B4-03DA-4A27-B6F7-AA801EF70CFF}" dt="2025-05-14T19:07:46.577" v="215" actId="1076"/>
+          <ac:spMkLst>
+            <pc:docMk/>
+            <pc:sldMk cId="876017896" sldId="265"/>
+            <ac:spMk id="50" creationId="{40A07E44-D155-92F2-E9CB-0DFAC3C597C3}"/>
+          </ac:spMkLst>
+        </pc:spChg>
+        <pc:spChg chg="add mod">
+          <ac:chgData name="Oppenheim, Tomas" userId="7bbdd6b4-1f3d-4fdd-ac21-d8c716941374" providerId="ADAL" clId="{F6B069B4-03DA-4A27-B6F7-AA801EF70CFF}" dt="2025-05-14T19:20:07.503" v="336" actId="20577"/>
+          <ac:spMkLst>
+            <pc:docMk/>
+            <pc:sldMk cId="876017896" sldId="265"/>
+            <ac:spMk id="62" creationId="{D1A162BD-D181-74C0-F2ED-C19C7E356584}"/>
+          </ac:spMkLst>
+        </pc:spChg>
+        <pc:spChg chg="add mod">
+          <ac:chgData name="Oppenheim, Tomas" userId="7bbdd6b4-1f3d-4fdd-ac21-d8c716941374" providerId="ADAL" clId="{F6B069B4-03DA-4A27-B6F7-AA801EF70CFF}" dt="2025-05-14T19:21:53.884" v="386" actId="1076"/>
+          <ac:spMkLst>
+            <pc:docMk/>
+            <pc:sldMk cId="876017896" sldId="265"/>
+            <ac:spMk id="71" creationId="{A345EB01-0E6E-D546-32F2-E6A0CD1F200A}"/>
+          </ac:spMkLst>
+        </pc:spChg>
+        <pc:spChg chg="add mod">
+          <ac:chgData name="Oppenheim, Tomas" userId="7bbdd6b4-1f3d-4fdd-ac21-d8c716941374" providerId="ADAL" clId="{F6B069B4-03DA-4A27-B6F7-AA801EF70CFF}" dt="2025-05-14T19:21:58.109" v="388" actId="1076"/>
+          <ac:spMkLst>
+            <pc:docMk/>
+            <pc:sldMk cId="876017896" sldId="265"/>
+            <ac:spMk id="72" creationId="{7201C09A-7385-48DF-1854-BA4BAF42055D}"/>
+          </ac:spMkLst>
+        </pc:spChg>
+        <pc:spChg chg="add mod">
+          <ac:chgData name="Oppenheim, Tomas" userId="7bbdd6b4-1f3d-4fdd-ac21-d8c716941374" providerId="ADAL" clId="{F6B069B4-03DA-4A27-B6F7-AA801EF70CFF}" dt="2025-05-14T19:42:24.947" v="602"/>
+          <ac:spMkLst>
+            <pc:docMk/>
+            <pc:sldMk cId="876017896" sldId="265"/>
+            <ac:spMk id="74" creationId="{D6B18780-3350-2509-23CD-587419A71D36}"/>
+          </ac:spMkLst>
+        </pc:spChg>
+        <pc:spChg chg="add mod">
+          <ac:chgData name="Oppenheim, Tomas" userId="7bbdd6b4-1f3d-4fdd-ac21-d8c716941374" providerId="ADAL" clId="{F6B069B4-03DA-4A27-B6F7-AA801EF70CFF}" dt="2025-05-14T19:22:21.227" v="393" actId="1076"/>
+          <ac:spMkLst>
+            <pc:docMk/>
+            <pc:sldMk cId="876017896" sldId="265"/>
+            <ac:spMk id="75" creationId="{98262070-1413-3B1A-21B3-C32C3D624051}"/>
+          </ac:spMkLst>
+        </pc:spChg>
+        <pc:spChg chg="add mod">
+          <ac:chgData name="Oppenheim, Tomas" userId="7bbdd6b4-1f3d-4fdd-ac21-d8c716941374" providerId="ADAL" clId="{F6B069B4-03DA-4A27-B6F7-AA801EF70CFF}" dt="2025-05-14T19:23:11.648" v="399" actId="1076"/>
+          <ac:spMkLst>
+            <pc:docMk/>
+            <pc:sldMk cId="876017896" sldId="265"/>
+            <ac:spMk id="78" creationId="{64CC42E5-97C5-3EA1-A38F-A47D8707FB80}"/>
+          </ac:spMkLst>
+        </pc:spChg>
+        <pc:spChg chg="add mod">
+          <ac:chgData name="Oppenheim, Tomas" userId="7bbdd6b4-1f3d-4fdd-ac21-d8c716941374" providerId="ADAL" clId="{F6B069B4-03DA-4A27-B6F7-AA801EF70CFF}" dt="2025-05-14T19:23:11.648" v="399" actId="1076"/>
+          <ac:spMkLst>
+            <pc:docMk/>
+            <pc:sldMk cId="876017896" sldId="265"/>
+            <ac:spMk id="79" creationId="{7EA98148-E0BB-A5D0-27E2-60E49C3F95A5}"/>
+          </ac:spMkLst>
+        </pc:spChg>
+        <pc:spChg chg="add mod">
+          <ac:chgData name="Oppenheim, Tomas" userId="7bbdd6b4-1f3d-4fdd-ac21-d8c716941374" providerId="ADAL" clId="{F6B069B4-03DA-4A27-B6F7-AA801EF70CFF}" dt="2025-05-14T19:23:32.083" v="402" actId="1076"/>
+          <ac:spMkLst>
+            <pc:docMk/>
+            <pc:sldMk cId="876017896" sldId="265"/>
+            <ac:spMk id="84" creationId="{46279F29-E108-DE07-4976-641B84D9E960}"/>
+          </ac:spMkLst>
+        </pc:spChg>
+        <pc:spChg chg="add mod">
+          <ac:chgData name="Oppenheim, Tomas" userId="7bbdd6b4-1f3d-4fdd-ac21-d8c716941374" providerId="ADAL" clId="{F6B069B4-03DA-4A27-B6F7-AA801EF70CFF}" dt="2025-05-14T19:23:40.263" v="417" actId="1036"/>
+          <ac:spMkLst>
+            <pc:docMk/>
+            <pc:sldMk cId="876017896" sldId="265"/>
+            <ac:spMk id="85" creationId="{B52D2CD6-4091-9A53-55DA-A075A7985496}"/>
+          </ac:spMkLst>
+        </pc:spChg>
+        <pc:spChg chg="add mod">
+          <ac:chgData name="Oppenheim, Tomas" userId="7bbdd6b4-1f3d-4fdd-ac21-d8c716941374" providerId="ADAL" clId="{F6B069B4-03DA-4A27-B6F7-AA801EF70CFF}" dt="2025-05-14T19:24:04.410" v="422" actId="207"/>
+          <ac:spMkLst>
+            <pc:docMk/>
+            <pc:sldMk cId="876017896" sldId="265"/>
+            <ac:spMk id="92" creationId="{4D2C9E58-0381-0396-A4FB-45A0FAD0F53C}"/>
+          </ac:spMkLst>
+        </pc:spChg>
+        <pc:spChg chg="add mod">
+          <ac:chgData name="Oppenheim, Tomas" userId="7bbdd6b4-1f3d-4fdd-ac21-d8c716941374" providerId="ADAL" clId="{F6B069B4-03DA-4A27-B6F7-AA801EF70CFF}" dt="2025-05-14T19:28:34.993" v="476" actId="1076"/>
+          <ac:spMkLst>
+            <pc:docMk/>
+            <pc:sldMk cId="876017896" sldId="265"/>
+            <ac:spMk id="93" creationId="{F9A08460-149C-B9E6-645D-BF7F78FBD7AA}"/>
+          </ac:spMkLst>
+        </pc:spChg>
+        <pc:spChg chg="add mod">
+          <ac:chgData name="Oppenheim, Tomas" userId="7bbdd6b4-1f3d-4fdd-ac21-d8c716941374" providerId="ADAL" clId="{F6B069B4-03DA-4A27-B6F7-AA801EF70CFF}" dt="2025-05-14T19:41:44.468" v="590" actId="1076"/>
+          <ac:spMkLst>
+            <pc:docMk/>
+            <pc:sldMk cId="876017896" sldId="265"/>
+            <ac:spMk id="95" creationId="{3DB8387C-0B5B-0627-872C-9F968FE19231}"/>
+          </ac:spMkLst>
+        </pc:spChg>
+        <pc:spChg chg="add mod">
+          <ac:chgData name="Oppenheim, Tomas" userId="7bbdd6b4-1f3d-4fdd-ac21-d8c716941374" providerId="ADAL" clId="{F6B069B4-03DA-4A27-B6F7-AA801EF70CFF}" dt="2025-05-14T19:28:58.665" v="486" actId="1076"/>
+          <ac:spMkLst>
+            <pc:docMk/>
+            <pc:sldMk cId="876017896" sldId="265"/>
+            <ac:spMk id="96" creationId="{BEABF460-986E-0D9E-265C-DF8810A93ABE}"/>
+          </ac:spMkLst>
+        </pc:spChg>
+        <pc:spChg chg="add mod">
+          <ac:chgData name="Oppenheim, Tomas" userId="7bbdd6b4-1f3d-4fdd-ac21-d8c716941374" providerId="ADAL" clId="{F6B069B4-03DA-4A27-B6F7-AA801EF70CFF}" dt="2025-05-14T19:28:56.548" v="485" actId="1076"/>
+          <ac:spMkLst>
+            <pc:docMk/>
+            <pc:sldMk cId="876017896" sldId="265"/>
+            <ac:spMk id="97" creationId="{BDFFAFC6-5A56-BC4D-F878-865AEE369167}"/>
+          </ac:spMkLst>
+        </pc:spChg>
+        <pc:spChg chg="add del mod">
+          <ac:chgData name="Oppenheim, Tomas" userId="7bbdd6b4-1f3d-4fdd-ac21-d8c716941374" providerId="ADAL" clId="{F6B069B4-03DA-4A27-B6F7-AA801EF70CFF}" dt="2025-05-14T19:41:03.930" v="526" actId="478"/>
+          <ac:spMkLst>
+            <pc:docMk/>
+            <pc:sldMk cId="876017896" sldId="265"/>
+            <ac:spMk id="100" creationId="{FDB9A07C-FD16-3B34-248B-4452DDC957AC}"/>
+          </ac:spMkLst>
+        </pc:spChg>
+        <pc:spChg chg="add mod">
+          <ac:chgData name="Oppenheim, Tomas" userId="7bbdd6b4-1f3d-4fdd-ac21-d8c716941374" providerId="ADAL" clId="{F6B069B4-03DA-4A27-B6F7-AA801EF70CFF}" dt="2025-05-14T19:29:40.634" v="507" actId="20577"/>
+          <ac:spMkLst>
+            <pc:docMk/>
+            <pc:sldMk cId="876017896" sldId="265"/>
+            <ac:spMk id="101" creationId="{78CE7EF9-134A-AA08-2DE8-804649CD8561}"/>
+          </ac:spMkLst>
+        </pc:spChg>
+        <pc:spChg chg="add mod">
+          <ac:chgData name="Oppenheim, Tomas" userId="7bbdd6b4-1f3d-4fdd-ac21-d8c716941374" providerId="ADAL" clId="{F6B069B4-03DA-4A27-B6F7-AA801EF70CFF}" dt="2025-05-14T19:41:37.850" v="589" actId="14100"/>
+          <ac:spMkLst>
+            <pc:docMk/>
+            <pc:sldMk cId="876017896" sldId="265"/>
+            <ac:spMk id="102" creationId="{552E9F1D-2719-4AFA-4BA7-F36D051D5902}"/>
+          </ac:spMkLst>
+        </pc:spChg>
+        <pc:spChg chg="add mod">
+          <ac:chgData name="Oppenheim, Tomas" userId="7bbdd6b4-1f3d-4fdd-ac21-d8c716941374" providerId="ADAL" clId="{F6B069B4-03DA-4A27-B6F7-AA801EF70CFF}" dt="2025-05-14T19:41:46.475" v="591" actId="1076"/>
+          <ac:spMkLst>
+            <pc:docMk/>
+            <pc:sldMk cId="876017896" sldId="265"/>
+            <ac:spMk id="105" creationId="{68051812-AD1F-B357-C89A-C9723BFB5C2B}"/>
+          </ac:spMkLst>
+        </pc:spChg>
+        <pc:spChg chg="add mod">
+          <ac:chgData name="Oppenheim, Tomas" userId="7bbdd6b4-1f3d-4fdd-ac21-d8c716941374" providerId="ADAL" clId="{F6B069B4-03DA-4A27-B6F7-AA801EF70CFF}" dt="2025-05-14T19:42:34.347" v="606" actId="1076"/>
+          <ac:spMkLst>
+            <pc:docMk/>
+            <pc:sldMk cId="876017896" sldId="265"/>
+            <ac:spMk id="114" creationId="{8DAF8A4C-F499-9B68-1EA8-1CE8E34C47DF}"/>
+          </ac:spMkLst>
+        </pc:spChg>
+        <pc:cxnChg chg="add mod">
+          <ac:chgData name="Oppenheim, Tomas" userId="7bbdd6b4-1f3d-4fdd-ac21-d8c716941374" providerId="ADAL" clId="{F6B069B4-03DA-4A27-B6F7-AA801EF70CFF}" dt="2025-05-14T18:59:59.957" v="78" actId="1076"/>
+          <ac:cxnSpMkLst>
+            <pc:docMk/>
+            <pc:sldMk cId="876017896" sldId="265"/>
+            <ac:cxnSpMk id="6" creationId="{9C0266D3-17F7-3C67-C04D-EF56B0BACC16}"/>
+          </ac:cxnSpMkLst>
+        </pc:cxnChg>
+        <pc:cxnChg chg="add mod">
+          <ac:chgData name="Oppenheim, Tomas" userId="7bbdd6b4-1f3d-4fdd-ac21-d8c716941374" providerId="ADAL" clId="{F6B069B4-03DA-4A27-B6F7-AA801EF70CFF}" dt="2025-05-14T18:59:33.202" v="70" actId="14100"/>
+          <ac:cxnSpMkLst>
+            <pc:docMk/>
+            <pc:sldMk cId="876017896" sldId="265"/>
+            <ac:cxnSpMk id="9" creationId="{7ED29E62-2882-D00F-C3AD-2013106CB454}"/>
+          </ac:cxnSpMkLst>
+        </pc:cxnChg>
+        <pc:cxnChg chg="add mod">
+          <ac:chgData name="Oppenheim, Tomas" userId="7bbdd6b4-1f3d-4fdd-ac21-d8c716941374" providerId="ADAL" clId="{F6B069B4-03DA-4A27-B6F7-AA801EF70CFF}" dt="2025-05-14T18:59:55.209" v="77" actId="1076"/>
+          <ac:cxnSpMkLst>
+            <pc:docMk/>
+            <pc:sldMk cId="876017896" sldId="265"/>
+            <ac:cxnSpMk id="10" creationId="{C596259E-32AE-8853-59F5-A2995DEAE57A}"/>
+          </ac:cxnSpMkLst>
+        </pc:cxnChg>
+        <pc:cxnChg chg="add mod">
+          <ac:chgData name="Oppenheim, Tomas" userId="7bbdd6b4-1f3d-4fdd-ac21-d8c716941374" providerId="ADAL" clId="{F6B069B4-03DA-4A27-B6F7-AA801EF70CFF}" dt="2025-05-14T18:59:38.038" v="72" actId="1076"/>
+          <ac:cxnSpMkLst>
+            <pc:docMk/>
+            <pc:sldMk cId="876017896" sldId="265"/>
+            <ac:cxnSpMk id="12" creationId="{C65680EB-09AA-3C94-4367-9866056DA58C}"/>
+          </ac:cxnSpMkLst>
+        </pc:cxnChg>
+        <pc:cxnChg chg="add mod">
+          <ac:chgData name="Oppenheim, Tomas" userId="7bbdd6b4-1f3d-4fdd-ac21-d8c716941374" providerId="ADAL" clId="{F6B069B4-03DA-4A27-B6F7-AA801EF70CFF}" dt="2025-05-14T18:59:42.542" v="74" actId="1076"/>
+          <ac:cxnSpMkLst>
+            <pc:docMk/>
+            <pc:sldMk cId="876017896" sldId="265"/>
+            <ac:cxnSpMk id="13" creationId="{0C6A4E1C-CD3D-A390-6A33-02397CA03899}"/>
+          </ac:cxnSpMkLst>
+        </pc:cxnChg>
+        <pc:cxnChg chg="add mod">
+          <ac:chgData name="Oppenheim, Tomas" userId="7bbdd6b4-1f3d-4fdd-ac21-d8c716941374" providerId="ADAL" clId="{F6B069B4-03DA-4A27-B6F7-AA801EF70CFF}" dt="2025-05-14T18:59:47.052" v="76" actId="1076"/>
+          <ac:cxnSpMkLst>
+            <pc:docMk/>
+            <pc:sldMk cId="876017896" sldId="265"/>
+            <ac:cxnSpMk id="14" creationId="{B8BD483F-C8E0-E6B7-78B7-66CB40B2BD3B}"/>
+          </ac:cxnSpMkLst>
+        </pc:cxnChg>
+        <pc:cxnChg chg="add mod">
+          <ac:chgData name="Oppenheim, Tomas" userId="7bbdd6b4-1f3d-4fdd-ac21-d8c716941374" providerId="ADAL" clId="{F6B069B4-03DA-4A27-B6F7-AA801EF70CFF}" dt="2025-05-14T19:00:03.819" v="80" actId="1076"/>
+          <ac:cxnSpMkLst>
+            <pc:docMk/>
+            <pc:sldMk cId="876017896" sldId="265"/>
+            <ac:cxnSpMk id="15" creationId="{2E4352AD-68D6-A049-1391-FA6AC3377CF3}"/>
+          </ac:cxnSpMkLst>
+        </pc:cxnChg>
+        <pc:cxnChg chg="add mod">
+          <ac:chgData name="Oppenheim, Tomas" userId="7bbdd6b4-1f3d-4fdd-ac21-d8c716941374" providerId="ADAL" clId="{F6B069B4-03DA-4A27-B6F7-AA801EF70CFF}" dt="2025-05-14T19:00:08.709" v="82" actId="1076"/>
+          <ac:cxnSpMkLst>
+            <pc:docMk/>
+            <pc:sldMk cId="876017896" sldId="265"/>
+            <ac:cxnSpMk id="16" creationId="{380E1F94-5971-3E4D-F757-E4F5CB7C6A09}"/>
+          </ac:cxnSpMkLst>
+        </pc:cxnChg>
+        <pc:cxnChg chg="add mod">
+          <ac:chgData name="Oppenheim, Tomas" userId="7bbdd6b4-1f3d-4fdd-ac21-d8c716941374" providerId="ADAL" clId="{F6B069B4-03DA-4A27-B6F7-AA801EF70CFF}" dt="2025-05-14T19:01:26.426" v="94" actId="1076"/>
+          <ac:cxnSpMkLst>
+            <pc:docMk/>
+            <pc:sldMk cId="876017896" sldId="265"/>
+            <ac:cxnSpMk id="21" creationId="{34215D9B-E2BC-0BB2-F248-0DEC19AFCA01}"/>
+          </ac:cxnSpMkLst>
+        </pc:cxnChg>
+        <pc:cxnChg chg="add mod">
+          <ac:chgData name="Oppenheim, Tomas" userId="7bbdd6b4-1f3d-4fdd-ac21-d8c716941374" providerId="ADAL" clId="{F6B069B4-03DA-4A27-B6F7-AA801EF70CFF}" dt="2025-05-14T19:01:33.166" v="96" actId="1076"/>
+          <ac:cxnSpMkLst>
+            <pc:docMk/>
+            <pc:sldMk cId="876017896" sldId="265"/>
+            <ac:cxnSpMk id="22" creationId="{0593A848-D145-DCDB-7253-E8700D07155B}"/>
+          </ac:cxnSpMkLst>
+        </pc:cxnChg>
+        <pc:cxnChg chg="add mod">
+          <ac:chgData name="Oppenheim, Tomas" userId="7bbdd6b4-1f3d-4fdd-ac21-d8c716941374" providerId="ADAL" clId="{F6B069B4-03DA-4A27-B6F7-AA801EF70CFF}" dt="2025-05-14T19:01:37.770" v="98" actId="1076"/>
+          <ac:cxnSpMkLst>
+            <pc:docMk/>
+            <pc:sldMk cId="876017896" sldId="265"/>
+            <ac:cxnSpMk id="23" creationId="{1B40DFD5-C984-B026-0D55-CDA1CDB3FFBD}"/>
+          </ac:cxnSpMkLst>
+        </pc:cxnChg>
+        <pc:cxnChg chg="add mod">
+          <ac:chgData name="Oppenheim, Tomas" userId="7bbdd6b4-1f3d-4fdd-ac21-d8c716941374" providerId="ADAL" clId="{F6B069B4-03DA-4A27-B6F7-AA801EF70CFF}" dt="2025-05-14T19:01:42.612" v="100" actId="1076"/>
+          <ac:cxnSpMkLst>
+            <pc:docMk/>
+            <pc:sldMk cId="876017896" sldId="265"/>
+            <ac:cxnSpMk id="24" creationId="{EE309011-FF14-0277-3440-A6345613E176}"/>
+          </ac:cxnSpMkLst>
+        </pc:cxnChg>
+        <pc:cxnChg chg="add mod">
+          <ac:chgData name="Oppenheim, Tomas" userId="7bbdd6b4-1f3d-4fdd-ac21-d8c716941374" providerId="ADAL" clId="{F6B069B4-03DA-4A27-B6F7-AA801EF70CFF}" dt="2025-05-14T19:18:46.325" v="299" actId="1076"/>
+          <ac:cxnSpMkLst>
+            <pc:docMk/>
+            <pc:sldMk cId="876017896" sldId="265"/>
+            <ac:cxnSpMk id="52" creationId="{D55B63EF-B7D1-B775-86BE-5470313F2D4D}"/>
+          </ac:cxnSpMkLst>
+        </pc:cxnChg>
+        <pc:cxnChg chg="add">
+          <ac:chgData name="Oppenheim, Tomas" userId="7bbdd6b4-1f3d-4fdd-ac21-d8c716941374" providerId="ADAL" clId="{F6B069B4-03DA-4A27-B6F7-AA801EF70CFF}" dt="2025-05-14T19:17:30.231" v="217" actId="11529"/>
+          <ac:cxnSpMkLst>
+            <pc:docMk/>
+            <pc:sldMk cId="876017896" sldId="265"/>
+            <ac:cxnSpMk id="54" creationId="{51CEF0CC-5520-D28C-4458-3295590C5D7A}"/>
+          </ac:cxnSpMkLst>
+        </pc:cxnChg>
+        <pc:cxnChg chg="add mod">
+          <ac:chgData name="Oppenheim, Tomas" userId="7bbdd6b4-1f3d-4fdd-ac21-d8c716941374" providerId="ADAL" clId="{F6B069B4-03DA-4A27-B6F7-AA801EF70CFF}" dt="2025-05-14T19:17:54.149" v="231" actId="1036"/>
+          <ac:cxnSpMkLst>
+            <pc:docMk/>
+            <pc:sldMk cId="876017896" sldId="265"/>
+            <ac:cxnSpMk id="56" creationId="{80DB1E0A-1B02-3B52-D9DC-4BBEF606DFF4}"/>
+          </ac:cxnSpMkLst>
+        </pc:cxnChg>
+        <pc:cxnChg chg="add mod">
+          <ac:chgData name="Oppenheim, Tomas" userId="7bbdd6b4-1f3d-4fdd-ac21-d8c716941374" providerId="ADAL" clId="{F6B069B4-03DA-4A27-B6F7-AA801EF70CFF}" dt="2025-05-14T19:18:02.068" v="233" actId="1076"/>
+          <ac:cxnSpMkLst>
+            <pc:docMk/>
+            <pc:sldMk cId="876017896" sldId="265"/>
+            <ac:cxnSpMk id="57" creationId="{3101572E-D6F4-1E5C-38D9-BBC86F8E5FAB}"/>
+          </ac:cxnSpMkLst>
+        </pc:cxnChg>
+        <pc:cxnChg chg="add mod">
+          <ac:chgData name="Oppenheim, Tomas" userId="7bbdd6b4-1f3d-4fdd-ac21-d8c716941374" providerId="ADAL" clId="{F6B069B4-03DA-4A27-B6F7-AA801EF70CFF}" dt="2025-05-14T19:18:08.124" v="235" actId="1076"/>
+          <ac:cxnSpMkLst>
+            <pc:docMk/>
+            <pc:sldMk cId="876017896" sldId="265"/>
+            <ac:cxnSpMk id="58" creationId="{EBD6EC82-762F-C9F2-E10E-351B2EFC0218}"/>
+          </ac:cxnSpMkLst>
+        </pc:cxnChg>
+        <pc:cxnChg chg="add mod">
+          <ac:chgData name="Oppenheim, Tomas" userId="7bbdd6b4-1f3d-4fdd-ac21-d8c716941374" providerId="ADAL" clId="{F6B069B4-03DA-4A27-B6F7-AA801EF70CFF}" dt="2025-05-14T19:18:11.887" v="237" actId="1076"/>
+          <ac:cxnSpMkLst>
+            <pc:docMk/>
+            <pc:sldMk cId="876017896" sldId="265"/>
+            <ac:cxnSpMk id="59" creationId="{9CA8189F-A287-7DF0-392B-F7A203229D4F}"/>
+          </ac:cxnSpMkLst>
+        </pc:cxnChg>
+        <pc:cxnChg chg="add del mod">
+          <ac:chgData name="Oppenheim, Tomas" userId="7bbdd6b4-1f3d-4fdd-ac21-d8c716941374" providerId="ADAL" clId="{F6B069B4-03DA-4A27-B6F7-AA801EF70CFF}" dt="2025-05-14T19:18:24.137" v="240" actId="478"/>
+          <ac:cxnSpMkLst>
+            <pc:docMk/>
+            <pc:sldMk cId="876017896" sldId="265"/>
+            <ac:cxnSpMk id="60" creationId="{1791DDAE-598C-28D6-2A27-248ED1F72055}"/>
+          </ac:cxnSpMkLst>
+        </pc:cxnChg>
+        <pc:cxnChg chg="add mod">
+          <ac:chgData name="Oppenheim, Tomas" userId="7bbdd6b4-1f3d-4fdd-ac21-d8c716941374" providerId="ADAL" clId="{F6B069B4-03DA-4A27-B6F7-AA801EF70CFF}" dt="2025-05-14T19:20:51.011" v="359" actId="1076"/>
+          <ac:cxnSpMkLst>
+            <pc:docMk/>
+            <pc:sldMk cId="876017896" sldId="265"/>
+            <ac:cxnSpMk id="63" creationId="{7AC047CF-F680-B1AC-35ED-6CD8B19B0969}"/>
+          </ac:cxnSpMkLst>
+        </pc:cxnChg>
+        <pc:cxnChg chg="add mod">
+          <ac:chgData name="Oppenheim, Tomas" userId="7bbdd6b4-1f3d-4fdd-ac21-d8c716941374" providerId="ADAL" clId="{F6B069B4-03DA-4A27-B6F7-AA801EF70CFF}" dt="2025-05-14T19:21:03.897" v="365" actId="1076"/>
+          <ac:cxnSpMkLst>
+            <pc:docMk/>
+            <pc:sldMk cId="876017896" sldId="265"/>
+            <ac:cxnSpMk id="64" creationId="{7799C66B-AB10-E22B-DAB1-937DF97F7A44}"/>
+          </ac:cxnSpMkLst>
+        </pc:cxnChg>
+        <pc:cxnChg chg="add mod">
+          <ac:chgData name="Oppenheim, Tomas" userId="7bbdd6b4-1f3d-4fdd-ac21-d8c716941374" providerId="ADAL" clId="{F6B069B4-03DA-4A27-B6F7-AA801EF70CFF}" dt="2025-05-14T19:21:41.255" v="377" actId="14100"/>
+          <ac:cxnSpMkLst>
+            <pc:docMk/>
+            <pc:sldMk cId="876017896" sldId="265"/>
+            <ac:cxnSpMk id="65" creationId="{41FAB72E-2D32-2A8F-F068-0EA6DCFD4829}"/>
+          </ac:cxnSpMkLst>
+        </pc:cxnChg>
+        <pc:cxnChg chg="add mod">
+          <ac:chgData name="Oppenheim, Tomas" userId="7bbdd6b4-1f3d-4fdd-ac21-d8c716941374" providerId="ADAL" clId="{F6B069B4-03DA-4A27-B6F7-AA801EF70CFF}" dt="2025-05-14T19:21:38.186" v="376" actId="14100"/>
+          <ac:cxnSpMkLst>
+            <pc:docMk/>
+            <pc:sldMk cId="876017896" sldId="265"/>
+            <ac:cxnSpMk id="68" creationId="{D85E4E75-D735-43FF-D148-430E2C2E40BD}"/>
+          </ac:cxnSpMkLst>
+        </pc:cxnChg>
+        <pc:cxnChg chg="add mod">
+          <ac:chgData name="Oppenheim, Tomas" userId="7bbdd6b4-1f3d-4fdd-ac21-d8c716941374" providerId="ADAL" clId="{F6B069B4-03DA-4A27-B6F7-AA801EF70CFF}" dt="2025-05-14T19:41:53.714" v="594" actId="14100"/>
+          <ac:cxnSpMkLst>
+            <pc:docMk/>
+            <pc:sldMk cId="876017896" sldId="265"/>
+            <ac:cxnSpMk id="76" creationId="{43221BB7-653A-9761-D33C-95509937C027}"/>
+          </ac:cxnSpMkLst>
+        </pc:cxnChg>
+        <pc:cxnChg chg="add mod">
+          <ac:chgData name="Oppenheim, Tomas" userId="7bbdd6b4-1f3d-4fdd-ac21-d8c716941374" providerId="ADAL" clId="{F6B069B4-03DA-4A27-B6F7-AA801EF70CFF}" dt="2025-05-14T19:23:32.083" v="402" actId="1076"/>
+          <ac:cxnSpMkLst>
+            <pc:docMk/>
+            <pc:sldMk cId="876017896" sldId="265"/>
+            <ac:cxnSpMk id="80" creationId="{EF2ECA01-CCB5-2605-6A57-55B9B85DD2CA}"/>
+          </ac:cxnSpMkLst>
+        </pc:cxnChg>
+        <pc:cxnChg chg="add mod">
+          <ac:chgData name="Oppenheim, Tomas" userId="7bbdd6b4-1f3d-4fdd-ac21-d8c716941374" providerId="ADAL" clId="{F6B069B4-03DA-4A27-B6F7-AA801EF70CFF}" dt="2025-05-14T19:23:35.225" v="403" actId="1076"/>
+          <ac:cxnSpMkLst>
+            <pc:docMk/>
+            <pc:sldMk cId="876017896" sldId="265"/>
+            <ac:cxnSpMk id="81" creationId="{B974C9D6-191F-D360-0BEB-B96B92C3B210}"/>
+          </ac:cxnSpMkLst>
+        </pc:cxnChg>
+        <pc:cxnChg chg="add mod">
+          <ac:chgData name="Oppenheim, Tomas" userId="7bbdd6b4-1f3d-4fdd-ac21-d8c716941374" providerId="ADAL" clId="{F6B069B4-03DA-4A27-B6F7-AA801EF70CFF}" dt="2025-05-14T19:23:40.263" v="417" actId="1036"/>
+          <ac:cxnSpMkLst>
+            <pc:docMk/>
+            <pc:sldMk cId="876017896" sldId="265"/>
+            <ac:cxnSpMk id="82" creationId="{EB32E966-8B0A-BA48-7D99-167D95FD9244}"/>
+          </ac:cxnSpMkLst>
+        </pc:cxnChg>
+        <pc:cxnChg chg="add mod">
+          <ac:chgData name="Oppenheim, Tomas" userId="7bbdd6b4-1f3d-4fdd-ac21-d8c716941374" providerId="ADAL" clId="{F6B069B4-03DA-4A27-B6F7-AA801EF70CFF}" dt="2025-05-14T19:23:32.083" v="402" actId="1076"/>
+          <ac:cxnSpMkLst>
+            <pc:docMk/>
+            <pc:sldMk cId="876017896" sldId="265"/>
+            <ac:cxnSpMk id="83" creationId="{9E3C70BA-F811-896B-EBE0-D1254F07A8A3}"/>
+          </ac:cxnSpMkLst>
+        </pc:cxnChg>
+        <pc:cxnChg chg="add">
+          <ac:chgData name="Oppenheim, Tomas" userId="7bbdd6b4-1f3d-4fdd-ac21-d8c716941374" providerId="ADAL" clId="{F6B069B4-03DA-4A27-B6F7-AA801EF70CFF}" dt="2025-05-14T19:23:55.257" v="418" actId="11529"/>
+          <ac:cxnSpMkLst>
+            <pc:docMk/>
+            <pc:sldMk cId="876017896" sldId="265"/>
+            <ac:cxnSpMk id="91" creationId="{9509BA30-7370-33DF-24A0-D048BF89ABC9}"/>
+          </ac:cxnSpMkLst>
+        </pc:cxnChg>
+        <pc:cxnChg chg="add mod">
+          <ac:chgData name="Oppenheim, Tomas" userId="7bbdd6b4-1f3d-4fdd-ac21-d8c716941374" providerId="ADAL" clId="{F6B069B4-03DA-4A27-B6F7-AA801EF70CFF}" dt="2025-05-14T19:41:51.119" v="593" actId="14100"/>
+          <ac:cxnSpMkLst>
+            <pc:docMk/>
+            <pc:sldMk cId="876017896" sldId="265"/>
+            <ac:cxnSpMk id="94" creationId="{70A7A265-D93C-D1D5-E811-08AA54604F0C}"/>
+          </ac:cxnSpMkLst>
+        </pc:cxnChg>
+        <pc:cxnChg chg="add mod">
+          <ac:chgData name="Oppenheim, Tomas" userId="7bbdd6b4-1f3d-4fdd-ac21-d8c716941374" providerId="ADAL" clId="{F6B069B4-03DA-4A27-B6F7-AA801EF70CFF}" dt="2025-05-14T19:41:57.993" v="595" actId="14100"/>
+          <ac:cxnSpMkLst>
+            <pc:docMk/>
+            <pc:sldMk cId="876017896" sldId="265"/>
+            <ac:cxnSpMk id="98" creationId="{0FCA60CA-4AEE-0D9A-A1C7-2542A6496810}"/>
+          </ac:cxnSpMkLst>
+        </pc:cxnChg>
+        <pc:cxnChg chg="add mod">
+          <ac:chgData name="Oppenheim, Tomas" userId="7bbdd6b4-1f3d-4fdd-ac21-d8c716941374" providerId="ADAL" clId="{F6B069B4-03DA-4A27-B6F7-AA801EF70CFF}" dt="2025-05-14T19:42:09.193" v="598" actId="14100"/>
+          <ac:cxnSpMkLst>
+            <pc:docMk/>
+            <pc:sldMk cId="876017896" sldId="265"/>
+            <ac:cxnSpMk id="99" creationId="{B22B85DC-4219-FBCE-AF3E-39C18D3E185D}"/>
+          </ac:cxnSpMkLst>
+        </pc:cxnChg>
+        <pc:cxnChg chg="add del mod">
+          <ac:chgData name="Oppenheim, Tomas" userId="7bbdd6b4-1f3d-4fdd-ac21-d8c716941374" providerId="ADAL" clId="{F6B069B4-03DA-4A27-B6F7-AA801EF70CFF}" dt="2025-05-14T19:41:05.899" v="527" actId="478"/>
+          <ac:cxnSpMkLst>
+            <pc:docMk/>
+            <pc:sldMk cId="876017896" sldId="265"/>
+            <ac:cxnSpMk id="104" creationId="{D00709E1-FB51-8AA4-B481-52DFFCD1E2B4}"/>
+          </ac:cxnSpMkLst>
+        </pc:cxnChg>
+        <pc:cxnChg chg="add mod">
+          <ac:chgData name="Oppenheim, Tomas" userId="7bbdd6b4-1f3d-4fdd-ac21-d8c716941374" providerId="ADAL" clId="{F6B069B4-03DA-4A27-B6F7-AA801EF70CFF}" dt="2025-05-14T19:42:20.728" v="601" actId="14100"/>
+          <ac:cxnSpMkLst>
+            <pc:docMk/>
+            <pc:sldMk cId="876017896" sldId="265"/>
+            <ac:cxnSpMk id="111" creationId="{24C3E237-8042-67EA-ED9D-016668DD088C}"/>
+          </ac:cxnSpMkLst>
+        </pc:cxnChg>
+      </pc:sldChg>
     </pc:docChg>
   </pc:docChgLst>
 </pc:chgInfo>
@@ -300,7 +1020,7 @@
           <a:p>
             <a:fld id="{4843895E-7B2D-4D4F-87F5-76328153F6F7}" type="datetimeFigureOut">
               <a:rPr lang="en-US" smtClean="0"/>
-              <a:t>5/12/2025</a:t>
+              <a:t>5/14/2025</a:t>
             </a:fld>
             <a:endParaRPr lang="en-US"/>
           </a:p>
@@ -468,7 +1188,7 @@
           <a:p>
             <a:fld id="{4843895E-7B2D-4D4F-87F5-76328153F6F7}" type="datetimeFigureOut">
               <a:rPr lang="en-US" smtClean="0"/>
-              <a:t>5/12/2025</a:t>
+              <a:t>5/14/2025</a:t>
             </a:fld>
             <a:endParaRPr lang="en-US"/>
           </a:p>
@@ -646,7 +1366,7 @@
           <a:p>
             <a:fld id="{4843895E-7B2D-4D4F-87F5-76328153F6F7}" type="datetimeFigureOut">
               <a:rPr lang="en-US" smtClean="0"/>
-              <a:t>5/12/2025</a:t>
+              <a:t>5/14/2025</a:t>
             </a:fld>
             <a:endParaRPr lang="en-US"/>
           </a:p>
@@ -814,7 +1534,7 @@
           <a:p>
             <a:fld id="{4843895E-7B2D-4D4F-87F5-76328153F6F7}" type="datetimeFigureOut">
               <a:rPr lang="en-US" smtClean="0"/>
-              <a:t>5/12/2025</a:t>
+              <a:t>5/14/2025</a:t>
             </a:fld>
             <a:endParaRPr lang="en-US"/>
           </a:p>
@@ -1059,7 +1779,7 @@
           <a:p>
             <a:fld id="{4843895E-7B2D-4D4F-87F5-76328153F6F7}" type="datetimeFigureOut">
               <a:rPr lang="en-US" smtClean="0"/>
-              <a:t>5/12/2025</a:t>
+              <a:t>5/14/2025</a:t>
             </a:fld>
             <a:endParaRPr lang="en-US"/>
           </a:p>
@@ -1288,7 +2008,7 @@
           <a:p>
             <a:fld id="{4843895E-7B2D-4D4F-87F5-76328153F6F7}" type="datetimeFigureOut">
               <a:rPr lang="en-US" smtClean="0"/>
-              <a:t>5/12/2025</a:t>
+              <a:t>5/14/2025</a:t>
             </a:fld>
             <a:endParaRPr lang="en-US"/>
           </a:p>
@@ -1652,7 +2372,7 @@
           <a:p>
             <a:fld id="{4843895E-7B2D-4D4F-87F5-76328153F6F7}" type="datetimeFigureOut">
               <a:rPr lang="en-US" smtClean="0"/>
-              <a:t>5/12/2025</a:t>
+              <a:t>5/14/2025</a:t>
             </a:fld>
             <a:endParaRPr lang="en-US"/>
           </a:p>
@@ -1769,7 +2489,7 @@
           <a:p>
             <a:fld id="{4843895E-7B2D-4D4F-87F5-76328153F6F7}" type="datetimeFigureOut">
               <a:rPr lang="en-US" smtClean="0"/>
-              <a:t>5/12/2025</a:t>
+              <a:t>5/14/2025</a:t>
             </a:fld>
             <a:endParaRPr lang="en-US"/>
           </a:p>
@@ -1864,7 +2584,7 @@
           <a:p>
             <a:fld id="{4843895E-7B2D-4D4F-87F5-76328153F6F7}" type="datetimeFigureOut">
               <a:rPr lang="en-US" smtClean="0"/>
-              <a:t>5/12/2025</a:t>
+              <a:t>5/14/2025</a:t>
             </a:fld>
             <a:endParaRPr lang="en-US"/>
           </a:p>
@@ -2139,7 +2859,7 @@
           <a:p>
             <a:fld id="{4843895E-7B2D-4D4F-87F5-76328153F6F7}" type="datetimeFigureOut">
               <a:rPr lang="en-US" smtClean="0"/>
-              <a:t>5/12/2025</a:t>
+              <a:t>5/14/2025</a:t>
             </a:fld>
             <a:endParaRPr lang="en-US"/>
           </a:p>
@@ -2391,7 +3111,7 @@
           <a:p>
             <a:fld id="{4843895E-7B2D-4D4F-87F5-76328153F6F7}" type="datetimeFigureOut">
               <a:rPr lang="en-US" smtClean="0"/>
-              <a:t>5/12/2025</a:t>
+              <a:t>5/14/2025</a:t>
             </a:fld>
             <a:endParaRPr lang="en-US"/>
           </a:p>
@@ -2602,7 +3322,7 @@
           <a:p>
             <a:fld id="{4843895E-7B2D-4D4F-87F5-76328153F6F7}" type="datetimeFigureOut">
               <a:rPr lang="en-US" smtClean="0"/>
-              <a:t>5/12/2025</a:t>
+              <a:t>5/14/2025</a:t>
             </a:fld>
             <a:endParaRPr lang="en-US"/>
           </a:p>
@@ -11638,6 +12358,3163 @@
 </p:sld>
 </file>
 
+<file path=ppt/slides/slide9.xml><?xml version="1.0" encoding="utf-8"?>
+<p:sld xmlns:a="http://schemas.openxmlformats.org/drawingml/2006/main" xmlns:r="http://schemas.openxmlformats.org/officeDocument/2006/relationships" xmlns:p="http://schemas.openxmlformats.org/presentationml/2006/main">
+  <p:cSld>
+    <p:spTree>
+      <p:nvGrpSpPr>
+        <p:cNvPr id="1" name=""/>
+        <p:cNvGrpSpPr/>
+        <p:nvPr/>
+      </p:nvGrpSpPr>
+      <p:grpSpPr>
+        <a:xfrm>
+          <a:off x="0" y="0"/>
+          <a:ext cx="0" cy="0"/>
+          <a:chOff x="0" y="0"/>
+          <a:chExt cx="0" cy="0"/>
+        </a:xfrm>
+      </p:grpSpPr>
+      <p:sp>
+        <p:nvSpPr>
+          <p:cNvPr id="4" name="TextBox 3">
+            <a:extLst>
+              <a:ext uri="{FF2B5EF4-FFF2-40B4-BE49-F238E27FC236}">
+                <a16:creationId xmlns:a16="http://schemas.microsoft.com/office/drawing/2014/main" id="{7B2058FD-B1A9-4F18-6FF1-92BC1425BF2B}"/>
+              </a:ext>
+            </a:extLst>
+          </p:cNvPr>
+          <p:cNvSpPr txBox="1"/>
+          <p:nvPr/>
+        </p:nvSpPr>
+        <p:spPr>
+          <a:xfrm>
+            <a:off x="84990" y="108261"/>
+            <a:ext cx="8258910" cy="369332"/>
+          </a:xfrm>
+          <a:prstGeom prst="rect">
+            <a:avLst/>
+          </a:prstGeom>
+        </p:spPr>
+        <p:style>
+          <a:lnRef idx="2">
+            <a:schemeClr val="dk1"/>
+          </a:lnRef>
+          <a:fillRef idx="1">
+            <a:schemeClr val="lt1"/>
+          </a:fillRef>
+          <a:effectRef idx="0">
+            <a:schemeClr val="dk1"/>
+          </a:effectRef>
+          <a:fontRef idx="minor">
+            <a:schemeClr val="dk1"/>
+          </a:fontRef>
+        </p:style>
+        <p:txBody>
+          <a:bodyPr wrap="square" rtlCol="0">
+            <a:spAutoFit/>
+          </a:bodyPr>
+          <a:lstStyle/>
+          <a:p>
+            <a:pPr algn="ctr"/>
+            <a:r>
+              <a:rPr lang="en-US" b="1" dirty="0"/>
+              <a:t>Circuit 5 for Camera Setup:</a:t>
+            </a:r>
+            <a:r>
+              <a:rPr lang="en-US" b="1" dirty="0">
+                <a:solidFill>
+                  <a:srgbClr val="FF0000"/>
+                </a:solidFill>
+              </a:rPr>
+              <a:t> 65 mA through each divider (can be adjusted to 15mA)</a:t>
+            </a:r>
+            <a:endParaRPr lang="en-US" b="1" dirty="0"/>
+          </a:p>
+        </p:txBody>
+      </p:sp>
+      <p:sp>
+        <p:nvSpPr>
+          <p:cNvPr id="5" name="Rectangle 4">
+            <a:extLst>
+              <a:ext uri="{FF2B5EF4-FFF2-40B4-BE49-F238E27FC236}">
+                <a16:creationId xmlns:a16="http://schemas.microsoft.com/office/drawing/2014/main" id="{46256668-5A6D-0153-A1F3-5957E20024CD}"/>
+              </a:ext>
+            </a:extLst>
+          </p:cNvPr>
+          <p:cNvSpPr/>
+          <p:nvPr/>
+        </p:nvSpPr>
+        <p:spPr>
+          <a:xfrm>
+            <a:off x="1320361" y="3656914"/>
+            <a:ext cx="575441" cy="437493"/>
+          </a:xfrm>
+          <a:prstGeom prst="rect">
+            <a:avLst/>
+          </a:prstGeom>
+        </p:spPr>
+        <p:style>
+          <a:lnRef idx="2">
+            <a:schemeClr val="accent1">
+              <a:shade val="15000"/>
+            </a:schemeClr>
+          </a:lnRef>
+          <a:fillRef idx="1">
+            <a:schemeClr val="accent1"/>
+          </a:fillRef>
+          <a:effectRef idx="0">
+            <a:schemeClr val="accent1"/>
+          </a:effectRef>
+          <a:fontRef idx="minor">
+            <a:schemeClr val="lt1"/>
+          </a:fontRef>
+        </p:style>
+        <p:txBody>
+          <a:bodyPr rtlCol="0" anchor="ctr"/>
+          <a:lstStyle/>
+          <a:p>
+            <a:pPr algn="ctr"/>
+            <a:endParaRPr lang="en-US"/>
+          </a:p>
+        </p:txBody>
+      </p:sp>
+      <p:cxnSp>
+        <p:nvCxnSpPr>
+          <p:cNvPr id="6" name="Straight Connector 5">
+            <a:extLst>
+              <a:ext uri="{FF2B5EF4-FFF2-40B4-BE49-F238E27FC236}">
+                <a16:creationId xmlns:a16="http://schemas.microsoft.com/office/drawing/2014/main" id="{9C0266D3-17F7-3C67-C04D-EF56B0BACC16}"/>
+              </a:ext>
+            </a:extLst>
+          </p:cNvPr>
+          <p:cNvCxnSpPr/>
+          <p:nvPr/>
+        </p:nvCxnSpPr>
+        <p:spPr>
+          <a:xfrm flipH="1" flipV="1">
+            <a:off x="1608080" y="4094407"/>
+            <a:ext cx="1" cy="685115"/>
+          </a:xfrm>
+          <a:prstGeom prst="line">
+            <a:avLst/>
+          </a:prstGeom>
+        </p:spPr>
+        <p:style>
+          <a:lnRef idx="1">
+            <a:schemeClr val="accent1"/>
+          </a:lnRef>
+          <a:fillRef idx="0">
+            <a:schemeClr val="accent1"/>
+          </a:fillRef>
+          <a:effectRef idx="0">
+            <a:schemeClr val="accent1"/>
+          </a:effectRef>
+          <a:fontRef idx="minor">
+            <a:schemeClr val="tx1"/>
+          </a:fontRef>
+        </p:style>
+      </p:cxnSp>
+      <p:sp>
+        <p:nvSpPr>
+          <p:cNvPr id="7" name="TextBox 6">
+            <a:extLst>
+              <a:ext uri="{FF2B5EF4-FFF2-40B4-BE49-F238E27FC236}">
+                <a16:creationId xmlns:a16="http://schemas.microsoft.com/office/drawing/2014/main" id="{5E9AAF7A-6242-F9C4-B673-DE439C196A32}"/>
+              </a:ext>
+            </a:extLst>
+          </p:cNvPr>
+          <p:cNvSpPr txBox="1"/>
+          <p:nvPr/>
+        </p:nvSpPr>
+        <p:spPr>
+          <a:xfrm>
+            <a:off x="1320361" y="4740490"/>
+            <a:ext cx="760614" cy="369332"/>
+          </a:xfrm>
+          <a:prstGeom prst="rect">
+            <a:avLst/>
+          </a:prstGeom>
+          <a:noFill/>
+        </p:spPr>
+        <p:txBody>
+          <a:bodyPr wrap="square" rtlCol="0">
+            <a:spAutoFit/>
+          </a:bodyPr>
+          <a:lstStyle/>
+          <a:p>
+            <a:r>
+              <a:rPr lang="en-US" dirty="0"/>
+              <a:t>GND</a:t>
+            </a:r>
+          </a:p>
+        </p:txBody>
+      </p:sp>
+      <p:sp>
+        <p:nvSpPr>
+          <p:cNvPr id="8" name="TextBox 7">
+            <a:extLst>
+              <a:ext uri="{FF2B5EF4-FFF2-40B4-BE49-F238E27FC236}">
+                <a16:creationId xmlns:a16="http://schemas.microsoft.com/office/drawing/2014/main" id="{E7BE750F-370B-17C3-BB6C-3B69FBC97E9A}"/>
+              </a:ext>
+            </a:extLst>
+          </p:cNvPr>
+          <p:cNvSpPr txBox="1"/>
+          <p:nvPr/>
+        </p:nvSpPr>
+        <p:spPr>
+          <a:xfrm>
+            <a:off x="131541" y="3029804"/>
+            <a:ext cx="1387258" cy="646331"/>
+          </a:xfrm>
+          <a:prstGeom prst="rect">
+            <a:avLst/>
+          </a:prstGeom>
+          <a:noFill/>
+        </p:spPr>
+        <p:txBody>
+          <a:bodyPr wrap="square" rtlCol="0">
+            <a:spAutoFit/>
+          </a:bodyPr>
+          <a:lstStyle/>
+          <a:p>
+            <a:r>
+              <a:rPr lang="en-US" dirty="0"/>
+              <a:t>ADM7150 3.3V 800 mA</a:t>
+            </a:r>
+          </a:p>
+        </p:txBody>
+      </p:sp>
+      <p:cxnSp>
+        <p:nvCxnSpPr>
+          <p:cNvPr id="9" name="Straight Connector 8">
+            <a:extLst>
+              <a:ext uri="{FF2B5EF4-FFF2-40B4-BE49-F238E27FC236}">
+                <a16:creationId xmlns:a16="http://schemas.microsoft.com/office/drawing/2014/main" id="{7ED29E62-2882-D00F-C3AD-2013106CB454}"/>
+              </a:ext>
+            </a:extLst>
+          </p:cNvPr>
+          <p:cNvCxnSpPr>
+            <a:cxnSpLocks/>
+          </p:cNvCxnSpPr>
+          <p:nvPr/>
+        </p:nvCxnSpPr>
+        <p:spPr>
+          <a:xfrm flipV="1">
+            <a:off x="1631730" y="1759847"/>
+            <a:ext cx="0" cy="1297371"/>
+          </a:xfrm>
+          <a:prstGeom prst="line">
+            <a:avLst/>
+          </a:prstGeom>
+        </p:spPr>
+        <p:style>
+          <a:lnRef idx="1">
+            <a:schemeClr val="accent1"/>
+          </a:lnRef>
+          <a:fillRef idx="0">
+            <a:schemeClr val="accent1"/>
+          </a:fillRef>
+          <a:effectRef idx="0">
+            <a:schemeClr val="accent1"/>
+          </a:effectRef>
+          <a:fontRef idx="minor">
+            <a:schemeClr val="tx1"/>
+          </a:fontRef>
+        </p:style>
+      </p:cxnSp>
+      <p:cxnSp>
+        <p:nvCxnSpPr>
+          <p:cNvPr id="10" name="Straight Connector 9">
+            <a:extLst>
+              <a:ext uri="{FF2B5EF4-FFF2-40B4-BE49-F238E27FC236}">
+                <a16:creationId xmlns:a16="http://schemas.microsoft.com/office/drawing/2014/main" id="{C596259E-32AE-8853-59F5-A2995DEAE57A}"/>
+              </a:ext>
+            </a:extLst>
+          </p:cNvPr>
+          <p:cNvCxnSpPr>
+            <a:cxnSpLocks/>
+          </p:cNvCxnSpPr>
+          <p:nvPr/>
+        </p:nvCxnSpPr>
+        <p:spPr>
+          <a:xfrm rot="5400000" flipH="1" flipV="1">
+            <a:off x="1974286" y="1280326"/>
+            <a:ext cx="1" cy="685115"/>
+          </a:xfrm>
+          <a:prstGeom prst="line">
+            <a:avLst/>
+          </a:prstGeom>
+        </p:spPr>
+        <p:style>
+          <a:lnRef idx="1">
+            <a:schemeClr val="accent1"/>
+          </a:lnRef>
+          <a:fillRef idx="0">
+            <a:schemeClr val="accent1"/>
+          </a:fillRef>
+          <a:effectRef idx="0">
+            <a:schemeClr val="accent1"/>
+          </a:effectRef>
+          <a:fontRef idx="minor">
+            <a:schemeClr val="tx1"/>
+          </a:fontRef>
+        </p:style>
+      </p:cxnSp>
+      <p:cxnSp>
+        <p:nvCxnSpPr>
+          <p:cNvPr id="12" name="Straight Connector 11">
+            <a:extLst>
+              <a:ext uri="{FF2B5EF4-FFF2-40B4-BE49-F238E27FC236}">
+                <a16:creationId xmlns:a16="http://schemas.microsoft.com/office/drawing/2014/main" id="{C65680EB-09AA-3C94-4367-9866056DA58C}"/>
+              </a:ext>
+            </a:extLst>
+          </p:cNvPr>
+          <p:cNvCxnSpPr>
+            <a:cxnSpLocks/>
+          </p:cNvCxnSpPr>
+          <p:nvPr/>
+        </p:nvCxnSpPr>
+        <p:spPr>
+          <a:xfrm rot="5400000" flipH="1" flipV="1">
+            <a:off x="1974286" y="1974347"/>
+            <a:ext cx="1" cy="685115"/>
+          </a:xfrm>
+          <a:prstGeom prst="line">
+            <a:avLst/>
+          </a:prstGeom>
+        </p:spPr>
+        <p:style>
+          <a:lnRef idx="1">
+            <a:schemeClr val="accent1"/>
+          </a:lnRef>
+          <a:fillRef idx="0">
+            <a:schemeClr val="accent1"/>
+          </a:fillRef>
+          <a:effectRef idx="0">
+            <a:schemeClr val="accent1"/>
+          </a:effectRef>
+          <a:fontRef idx="minor">
+            <a:schemeClr val="tx1"/>
+          </a:fontRef>
+        </p:style>
+      </p:cxnSp>
+      <p:cxnSp>
+        <p:nvCxnSpPr>
+          <p:cNvPr id="13" name="Straight Connector 12">
+            <a:extLst>
+              <a:ext uri="{FF2B5EF4-FFF2-40B4-BE49-F238E27FC236}">
+                <a16:creationId xmlns:a16="http://schemas.microsoft.com/office/drawing/2014/main" id="{0C6A4E1C-CD3D-A390-6A33-02397CA03899}"/>
+              </a:ext>
+            </a:extLst>
+          </p:cNvPr>
+          <p:cNvCxnSpPr>
+            <a:cxnSpLocks/>
+          </p:cNvCxnSpPr>
+          <p:nvPr/>
+        </p:nvCxnSpPr>
+        <p:spPr>
+          <a:xfrm flipV="1">
+            <a:off x="1631729" y="974199"/>
+            <a:ext cx="0" cy="1297371"/>
+          </a:xfrm>
+          <a:prstGeom prst="line">
+            <a:avLst/>
+          </a:prstGeom>
+        </p:spPr>
+        <p:style>
+          <a:lnRef idx="1">
+            <a:schemeClr val="accent1"/>
+          </a:lnRef>
+          <a:fillRef idx="0">
+            <a:schemeClr val="accent1"/>
+          </a:fillRef>
+          <a:effectRef idx="0">
+            <a:schemeClr val="accent1"/>
+          </a:effectRef>
+          <a:fontRef idx="minor">
+            <a:schemeClr val="tx1"/>
+          </a:fontRef>
+        </p:style>
+      </p:cxnSp>
+      <p:cxnSp>
+        <p:nvCxnSpPr>
+          <p:cNvPr id="14" name="Straight Connector 13">
+            <a:extLst>
+              <a:ext uri="{FF2B5EF4-FFF2-40B4-BE49-F238E27FC236}">
+                <a16:creationId xmlns:a16="http://schemas.microsoft.com/office/drawing/2014/main" id="{B8BD483F-C8E0-E6B7-78B7-66CB40B2BD3B}"/>
+              </a:ext>
+            </a:extLst>
+          </p:cNvPr>
+          <p:cNvCxnSpPr>
+            <a:cxnSpLocks/>
+          </p:cNvCxnSpPr>
+          <p:nvPr/>
+        </p:nvCxnSpPr>
+        <p:spPr>
+          <a:xfrm rot="5400000" flipH="1" flipV="1">
+            <a:off x="1974286" y="659996"/>
+            <a:ext cx="1" cy="685115"/>
+          </a:xfrm>
+          <a:prstGeom prst="line">
+            <a:avLst/>
+          </a:prstGeom>
+        </p:spPr>
+        <p:style>
+          <a:lnRef idx="1">
+            <a:schemeClr val="accent1"/>
+          </a:lnRef>
+          <a:fillRef idx="0">
+            <a:schemeClr val="accent1"/>
+          </a:fillRef>
+          <a:effectRef idx="0">
+            <a:schemeClr val="accent1"/>
+          </a:effectRef>
+          <a:fontRef idx="minor">
+            <a:schemeClr val="tx1"/>
+          </a:fontRef>
+        </p:style>
+      </p:cxnSp>
+      <p:cxnSp>
+        <p:nvCxnSpPr>
+          <p:cNvPr id="15" name="Straight Connector 14">
+            <a:extLst>
+              <a:ext uri="{FF2B5EF4-FFF2-40B4-BE49-F238E27FC236}">
+                <a16:creationId xmlns:a16="http://schemas.microsoft.com/office/drawing/2014/main" id="{2E4352AD-68D6-A049-1391-FA6AC3377CF3}"/>
+              </a:ext>
+            </a:extLst>
+          </p:cNvPr>
+          <p:cNvCxnSpPr>
+            <a:cxnSpLocks/>
+          </p:cNvCxnSpPr>
+          <p:nvPr/>
+        </p:nvCxnSpPr>
+        <p:spPr>
+          <a:xfrm rot="5400000" flipH="1" flipV="1">
+            <a:off x="1974286" y="2693610"/>
+            <a:ext cx="1" cy="685115"/>
+          </a:xfrm>
+          <a:prstGeom prst="line">
+            <a:avLst/>
+          </a:prstGeom>
+        </p:spPr>
+        <p:style>
+          <a:lnRef idx="1">
+            <a:schemeClr val="accent1"/>
+          </a:lnRef>
+          <a:fillRef idx="0">
+            <a:schemeClr val="accent1"/>
+          </a:fillRef>
+          <a:effectRef idx="0">
+            <a:schemeClr val="accent1"/>
+          </a:effectRef>
+          <a:fontRef idx="minor">
+            <a:schemeClr val="tx1"/>
+          </a:fontRef>
+        </p:style>
+      </p:cxnSp>
+      <p:cxnSp>
+        <p:nvCxnSpPr>
+          <p:cNvPr id="16" name="Straight Connector 15">
+            <a:extLst>
+              <a:ext uri="{FF2B5EF4-FFF2-40B4-BE49-F238E27FC236}">
+                <a16:creationId xmlns:a16="http://schemas.microsoft.com/office/drawing/2014/main" id="{380E1F94-5971-3E4D-F757-E4F5CB7C6A09}"/>
+              </a:ext>
+            </a:extLst>
+          </p:cNvPr>
+          <p:cNvCxnSpPr>
+            <a:cxnSpLocks/>
+          </p:cNvCxnSpPr>
+          <p:nvPr/>
+        </p:nvCxnSpPr>
+        <p:spPr>
+          <a:xfrm flipV="1">
+            <a:off x="1630414" y="2444333"/>
+            <a:ext cx="0" cy="1297371"/>
+          </a:xfrm>
+          <a:prstGeom prst="line">
+            <a:avLst/>
+          </a:prstGeom>
+        </p:spPr>
+        <p:style>
+          <a:lnRef idx="1">
+            <a:schemeClr val="accent1"/>
+          </a:lnRef>
+          <a:fillRef idx="0">
+            <a:schemeClr val="accent1"/>
+          </a:fillRef>
+          <a:effectRef idx="0">
+            <a:schemeClr val="accent1"/>
+          </a:effectRef>
+          <a:fontRef idx="minor">
+            <a:schemeClr val="tx1"/>
+          </a:fontRef>
+        </p:style>
+      </p:cxnSp>
+      <p:sp>
+        <p:nvSpPr>
+          <p:cNvPr id="17" name="Rectangle 16">
+            <a:extLst>
+              <a:ext uri="{FF2B5EF4-FFF2-40B4-BE49-F238E27FC236}">
+                <a16:creationId xmlns:a16="http://schemas.microsoft.com/office/drawing/2014/main" id="{98495B46-5D1F-90C4-D045-A7031EEAB529}"/>
+              </a:ext>
+            </a:extLst>
+          </p:cNvPr>
+          <p:cNvSpPr/>
+          <p:nvPr/>
+        </p:nvSpPr>
+        <p:spPr>
+          <a:xfrm>
+            <a:off x="2316844" y="817888"/>
+            <a:ext cx="457197" cy="369329"/>
+          </a:xfrm>
+          <a:prstGeom prst="rect">
+            <a:avLst/>
+          </a:prstGeom>
+          <a:solidFill>
+            <a:srgbClr val="FFC000"/>
+          </a:solidFill>
+        </p:spPr>
+        <p:style>
+          <a:lnRef idx="2">
+            <a:schemeClr val="accent1">
+              <a:shade val="15000"/>
+            </a:schemeClr>
+          </a:lnRef>
+          <a:fillRef idx="1">
+            <a:schemeClr val="accent1"/>
+          </a:fillRef>
+          <a:effectRef idx="0">
+            <a:schemeClr val="accent1"/>
+          </a:effectRef>
+          <a:fontRef idx="minor">
+            <a:schemeClr val="lt1"/>
+          </a:fontRef>
+        </p:style>
+        <p:txBody>
+          <a:bodyPr rtlCol="0" anchor="ctr"/>
+          <a:lstStyle/>
+          <a:p>
+            <a:pPr algn="ctr"/>
+            <a:endParaRPr lang="en-US"/>
+          </a:p>
+        </p:txBody>
+      </p:sp>
+      <p:sp>
+        <p:nvSpPr>
+          <p:cNvPr id="18" name="Rectangle 17">
+            <a:extLst>
+              <a:ext uri="{FF2B5EF4-FFF2-40B4-BE49-F238E27FC236}">
+                <a16:creationId xmlns:a16="http://schemas.microsoft.com/office/drawing/2014/main" id="{61C38F38-B9FC-6A1E-3488-83AAE881D05F}"/>
+              </a:ext>
+            </a:extLst>
+          </p:cNvPr>
+          <p:cNvSpPr/>
+          <p:nvPr/>
+        </p:nvSpPr>
+        <p:spPr>
+          <a:xfrm>
+            <a:off x="2316843" y="1438218"/>
+            <a:ext cx="457197" cy="369329"/>
+          </a:xfrm>
+          <a:prstGeom prst="rect">
+            <a:avLst/>
+          </a:prstGeom>
+          <a:solidFill>
+            <a:srgbClr val="FFC000"/>
+          </a:solidFill>
+        </p:spPr>
+        <p:style>
+          <a:lnRef idx="2">
+            <a:schemeClr val="accent1">
+              <a:shade val="15000"/>
+            </a:schemeClr>
+          </a:lnRef>
+          <a:fillRef idx="1">
+            <a:schemeClr val="accent1"/>
+          </a:fillRef>
+          <a:effectRef idx="0">
+            <a:schemeClr val="accent1"/>
+          </a:effectRef>
+          <a:fontRef idx="minor">
+            <a:schemeClr val="lt1"/>
+          </a:fontRef>
+        </p:style>
+        <p:txBody>
+          <a:bodyPr rtlCol="0" anchor="ctr"/>
+          <a:lstStyle/>
+          <a:p>
+            <a:pPr algn="ctr"/>
+            <a:endParaRPr lang="en-US"/>
+          </a:p>
+        </p:txBody>
+      </p:sp>
+      <p:sp>
+        <p:nvSpPr>
+          <p:cNvPr id="19" name="Rectangle 18">
+            <a:extLst>
+              <a:ext uri="{FF2B5EF4-FFF2-40B4-BE49-F238E27FC236}">
+                <a16:creationId xmlns:a16="http://schemas.microsoft.com/office/drawing/2014/main" id="{E557B6B8-0733-8F05-F8C7-3249986E5AE4}"/>
+              </a:ext>
+            </a:extLst>
+          </p:cNvPr>
+          <p:cNvSpPr/>
+          <p:nvPr/>
+        </p:nvSpPr>
+        <p:spPr>
+          <a:xfrm>
+            <a:off x="2316842" y="2104828"/>
+            <a:ext cx="457197" cy="369329"/>
+          </a:xfrm>
+          <a:prstGeom prst="rect">
+            <a:avLst/>
+          </a:prstGeom>
+          <a:solidFill>
+            <a:srgbClr val="FFC000"/>
+          </a:solidFill>
+        </p:spPr>
+        <p:style>
+          <a:lnRef idx="2">
+            <a:schemeClr val="accent1">
+              <a:shade val="15000"/>
+            </a:schemeClr>
+          </a:lnRef>
+          <a:fillRef idx="1">
+            <a:schemeClr val="accent1"/>
+          </a:fillRef>
+          <a:effectRef idx="0">
+            <a:schemeClr val="accent1"/>
+          </a:effectRef>
+          <a:fontRef idx="minor">
+            <a:schemeClr val="lt1"/>
+          </a:fontRef>
+        </p:style>
+        <p:txBody>
+          <a:bodyPr rtlCol="0" anchor="ctr"/>
+          <a:lstStyle/>
+          <a:p>
+            <a:pPr algn="ctr"/>
+            <a:endParaRPr lang="en-US"/>
+          </a:p>
+        </p:txBody>
+      </p:sp>
+      <p:sp>
+        <p:nvSpPr>
+          <p:cNvPr id="20" name="Rectangle 19">
+            <a:extLst>
+              <a:ext uri="{FF2B5EF4-FFF2-40B4-BE49-F238E27FC236}">
+                <a16:creationId xmlns:a16="http://schemas.microsoft.com/office/drawing/2014/main" id="{AD57BAA8-8B22-3345-E881-735ECAFC098F}"/>
+              </a:ext>
+            </a:extLst>
+          </p:cNvPr>
+          <p:cNvSpPr/>
+          <p:nvPr/>
+        </p:nvSpPr>
+        <p:spPr>
+          <a:xfrm>
+            <a:off x="2318085" y="2898325"/>
+            <a:ext cx="457197" cy="369329"/>
+          </a:xfrm>
+          <a:prstGeom prst="rect">
+            <a:avLst/>
+          </a:prstGeom>
+          <a:solidFill>
+            <a:srgbClr val="FFC000"/>
+          </a:solidFill>
+        </p:spPr>
+        <p:style>
+          <a:lnRef idx="2">
+            <a:schemeClr val="accent1">
+              <a:shade val="15000"/>
+            </a:schemeClr>
+          </a:lnRef>
+          <a:fillRef idx="1">
+            <a:schemeClr val="accent1"/>
+          </a:fillRef>
+          <a:effectRef idx="0">
+            <a:schemeClr val="accent1"/>
+          </a:effectRef>
+          <a:fontRef idx="minor">
+            <a:schemeClr val="lt1"/>
+          </a:fontRef>
+        </p:style>
+        <p:txBody>
+          <a:bodyPr rtlCol="0" anchor="ctr"/>
+          <a:lstStyle/>
+          <a:p>
+            <a:pPr algn="ctr"/>
+            <a:endParaRPr lang="en-US"/>
+          </a:p>
+        </p:txBody>
+      </p:sp>
+      <p:cxnSp>
+        <p:nvCxnSpPr>
+          <p:cNvPr id="21" name="Straight Connector 20">
+            <a:extLst>
+              <a:ext uri="{FF2B5EF4-FFF2-40B4-BE49-F238E27FC236}">
+                <a16:creationId xmlns:a16="http://schemas.microsoft.com/office/drawing/2014/main" id="{34215D9B-E2BC-0BB2-F248-0DEC19AFCA01}"/>
+              </a:ext>
+            </a:extLst>
+          </p:cNvPr>
+          <p:cNvCxnSpPr>
+            <a:cxnSpLocks/>
+          </p:cNvCxnSpPr>
+          <p:nvPr/>
+        </p:nvCxnSpPr>
+        <p:spPr>
+          <a:xfrm rot="5400000" flipH="1" flipV="1">
+            <a:off x="3116597" y="667537"/>
+            <a:ext cx="1" cy="685115"/>
+          </a:xfrm>
+          <a:prstGeom prst="line">
+            <a:avLst/>
+          </a:prstGeom>
+        </p:spPr>
+        <p:style>
+          <a:lnRef idx="1">
+            <a:schemeClr val="accent1"/>
+          </a:lnRef>
+          <a:fillRef idx="0">
+            <a:schemeClr val="accent1"/>
+          </a:fillRef>
+          <a:effectRef idx="0">
+            <a:schemeClr val="accent1"/>
+          </a:effectRef>
+          <a:fontRef idx="minor">
+            <a:schemeClr val="tx1"/>
+          </a:fontRef>
+        </p:style>
+      </p:cxnSp>
+      <p:cxnSp>
+        <p:nvCxnSpPr>
+          <p:cNvPr id="22" name="Straight Connector 21">
+            <a:extLst>
+              <a:ext uri="{FF2B5EF4-FFF2-40B4-BE49-F238E27FC236}">
+                <a16:creationId xmlns:a16="http://schemas.microsoft.com/office/drawing/2014/main" id="{0593A848-D145-DCDB-7253-E8700D07155B}"/>
+              </a:ext>
+            </a:extLst>
+          </p:cNvPr>
+          <p:cNvCxnSpPr>
+            <a:cxnSpLocks/>
+          </p:cNvCxnSpPr>
+          <p:nvPr/>
+        </p:nvCxnSpPr>
+        <p:spPr>
+          <a:xfrm rot="5400000" flipH="1" flipV="1">
+            <a:off x="3116596" y="1265157"/>
+            <a:ext cx="1" cy="685115"/>
+          </a:xfrm>
+          <a:prstGeom prst="line">
+            <a:avLst/>
+          </a:prstGeom>
+        </p:spPr>
+        <p:style>
+          <a:lnRef idx="1">
+            <a:schemeClr val="accent1"/>
+          </a:lnRef>
+          <a:fillRef idx="0">
+            <a:schemeClr val="accent1"/>
+          </a:fillRef>
+          <a:effectRef idx="0">
+            <a:schemeClr val="accent1"/>
+          </a:effectRef>
+          <a:fontRef idx="minor">
+            <a:schemeClr val="tx1"/>
+          </a:fontRef>
+        </p:style>
+      </p:cxnSp>
+      <p:cxnSp>
+        <p:nvCxnSpPr>
+          <p:cNvPr id="23" name="Straight Connector 22">
+            <a:extLst>
+              <a:ext uri="{FF2B5EF4-FFF2-40B4-BE49-F238E27FC236}">
+                <a16:creationId xmlns:a16="http://schemas.microsoft.com/office/drawing/2014/main" id="{1B40DFD5-C984-B026-0D55-CDA1CDB3FFBD}"/>
+              </a:ext>
+            </a:extLst>
+          </p:cNvPr>
+          <p:cNvCxnSpPr>
+            <a:cxnSpLocks/>
+          </p:cNvCxnSpPr>
+          <p:nvPr/>
+        </p:nvCxnSpPr>
+        <p:spPr>
+          <a:xfrm rot="5400000" flipH="1" flipV="1">
+            <a:off x="3116595" y="1946933"/>
+            <a:ext cx="1" cy="685115"/>
+          </a:xfrm>
+          <a:prstGeom prst="line">
+            <a:avLst/>
+          </a:prstGeom>
+        </p:spPr>
+        <p:style>
+          <a:lnRef idx="1">
+            <a:schemeClr val="accent1"/>
+          </a:lnRef>
+          <a:fillRef idx="0">
+            <a:schemeClr val="accent1"/>
+          </a:fillRef>
+          <a:effectRef idx="0">
+            <a:schemeClr val="accent1"/>
+          </a:effectRef>
+          <a:fontRef idx="minor">
+            <a:schemeClr val="tx1"/>
+          </a:fontRef>
+        </p:style>
+      </p:cxnSp>
+      <p:cxnSp>
+        <p:nvCxnSpPr>
+          <p:cNvPr id="24" name="Straight Connector 23">
+            <a:extLst>
+              <a:ext uri="{FF2B5EF4-FFF2-40B4-BE49-F238E27FC236}">
+                <a16:creationId xmlns:a16="http://schemas.microsoft.com/office/drawing/2014/main" id="{EE309011-FF14-0277-3440-A6345613E176}"/>
+              </a:ext>
+            </a:extLst>
+          </p:cNvPr>
+          <p:cNvCxnSpPr>
+            <a:cxnSpLocks/>
+          </p:cNvCxnSpPr>
+          <p:nvPr/>
+        </p:nvCxnSpPr>
+        <p:spPr>
+          <a:xfrm rot="5400000" flipH="1" flipV="1">
+            <a:off x="3116595" y="2687247"/>
+            <a:ext cx="1" cy="685115"/>
+          </a:xfrm>
+          <a:prstGeom prst="line">
+            <a:avLst/>
+          </a:prstGeom>
+        </p:spPr>
+        <p:style>
+          <a:lnRef idx="1">
+            <a:schemeClr val="accent1"/>
+          </a:lnRef>
+          <a:fillRef idx="0">
+            <a:schemeClr val="accent1"/>
+          </a:fillRef>
+          <a:effectRef idx="0">
+            <a:schemeClr val="accent1"/>
+          </a:effectRef>
+          <a:fontRef idx="minor">
+            <a:schemeClr val="tx1"/>
+          </a:fontRef>
+        </p:style>
+      </p:cxnSp>
+      <p:sp>
+        <p:nvSpPr>
+          <p:cNvPr id="25" name="Rectangle 24">
+            <a:extLst>
+              <a:ext uri="{FF2B5EF4-FFF2-40B4-BE49-F238E27FC236}">
+                <a16:creationId xmlns:a16="http://schemas.microsoft.com/office/drawing/2014/main" id="{440E9DED-3FB1-8533-BE9E-FBF152ECDE62}"/>
+              </a:ext>
+            </a:extLst>
+          </p:cNvPr>
+          <p:cNvSpPr/>
+          <p:nvPr/>
+        </p:nvSpPr>
+        <p:spPr>
+          <a:xfrm>
+            <a:off x="3407292" y="825429"/>
+            <a:ext cx="457197" cy="369329"/>
+          </a:xfrm>
+          <a:prstGeom prst="rect">
+            <a:avLst/>
+          </a:prstGeom>
+          <a:solidFill>
+            <a:srgbClr val="FF0000"/>
+          </a:solidFill>
+        </p:spPr>
+        <p:style>
+          <a:lnRef idx="2">
+            <a:schemeClr val="accent1">
+              <a:shade val="15000"/>
+            </a:schemeClr>
+          </a:lnRef>
+          <a:fillRef idx="1">
+            <a:schemeClr val="accent1"/>
+          </a:fillRef>
+          <a:effectRef idx="0">
+            <a:schemeClr val="accent1"/>
+          </a:effectRef>
+          <a:fontRef idx="minor">
+            <a:schemeClr val="lt1"/>
+          </a:fontRef>
+        </p:style>
+        <p:txBody>
+          <a:bodyPr rtlCol="0" anchor="ctr"/>
+          <a:lstStyle/>
+          <a:p>
+            <a:pPr algn="ctr"/>
+            <a:endParaRPr lang="en-US"/>
+          </a:p>
+        </p:txBody>
+      </p:sp>
+      <p:sp>
+        <p:nvSpPr>
+          <p:cNvPr id="26" name="Rectangle 25">
+            <a:extLst>
+              <a:ext uri="{FF2B5EF4-FFF2-40B4-BE49-F238E27FC236}">
+                <a16:creationId xmlns:a16="http://schemas.microsoft.com/office/drawing/2014/main" id="{A7DE899E-595E-D35A-7720-E0FAF5C1CB95}"/>
+              </a:ext>
+            </a:extLst>
+          </p:cNvPr>
+          <p:cNvSpPr/>
+          <p:nvPr/>
+        </p:nvSpPr>
+        <p:spPr>
+          <a:xfrm>
+            <a:off x="3407291" y="1438218"/>
+            <a:ext cx="457197" cy="369329"/>
+          </a:xfrm>
+          <a:prstGeom prst="rect">
+            <a:avLst/>
+          </a:prstGeom>
+          <a:solidFill>
+            <a:srgbClr val="FF0000"/>
+          </a:solidFill>
+        </p:spPr>
+        <p:style>
+          <a:lnRef idx="2">
+            <a:schemeClr val="accent1">
+              <a:shade val="15000"/>
+            </a:schemeClr>
+          </a:lnRef>
+          <a:fillRef idx="1">
+            <a:schemeClr val="accent1"/>
+          </a:fillRef>
+          <a:effectRef idx="0">
+            <a:schemeClr val="accent1"/>
+          </a:effectRef>
+          <a:fontRef idx="minor">
+            <a:schemeClr val="lt1"/>
+          </a:fontRef>
+        </p:style>
+        <p:txBody>
+          <a:bodyPr rtlCol="0" anchor="ctr"/>
+          <a:lstStyle/>
+          <a:p>
+            <a:pPr algn="ctr"/>
+            <a:endParaRPr lang="en-US"/>
+          </a:p>
+        </p:txBody>
+      </p:sp>
+      <p:sp>
+        <p:nvSpPr>
+          <p:cNvPr id="27" name="Rectangle 26">
+            <a:extLst>
+              <a:ext uri="{FF2B5EF4-FFF2-40B4-BE49-F238E27FC236}">
+                <a16:creationId xmlns:a16="http://schemas.microsoft.com/office/drawing/2014/main" id="{EE7CDB47-CCE5-C8E4-0468-A0B2783853B5}"/>
+              </a:ext>
+            </a:extLst>
+          </p:cNvPr>
+          <p:cNvSpPr/>
+          <p:nvPr/>
+        </p:nvSpPr>
+        <p:spPr>
+          <a:xfrm>
+            <a:off x="3407290" y="2104828"/>
+            <a:ext cx="457197" cy="369329"/>
+          </a:xfrm>
+          <a:prstGeom prst="rect">
+            <a:avLst/>
+          </a:prstGeom>
+          <a:solidFill>
+            <a:srgbClr val="FF0000"/>
+          </a:solidFill>
+        </p:spPr>
+        <p:style>
+          <a:lnRef idx="2">
+            <a:schemeClr val="accent1">
+              <a:shade val="15000"/>
+            </a:schemeClr>
+          </a:lnRef>
+          <a:fillRef idx="1">
+            <a:schemeClr val="accent1"/>
+          </a:fillRef>
+          <a:effectRef idx="0">
+            <a:schemeClr val="accent1"/>
+          </a:effectRef>
+          <a:fontRef idx="minor">
+            <a:schemeClr val="lt1"/>
+          </a:fontRef>
+        </p:style>
+        <p:txBody>
+          <a:bodyPr rtlCol="0" anchor="ctr"/>
+          <a:lstStyle/>
+          <a:p>
+            <a:pPr algn="ctr"/>
+            <a:endParaRPr lang="en-US"/>
+          </a:p>
+        </p:txBody>
+      </p:sp>
+      <p:sp>
+        <p:nvSpPr>
+          <p:cNvPr id="28" name="Rectangle 27">
+            <a:extLst>
+              <a:ext uri="{FF2B5EF4-FFF2-40B4-BE49-F238E27FC236}">
+                <a16:creationId xmlns:a16="http://schemas.microsoft.com/office/drawing/2014/main" id="{E78FAAD9-7278-DD08-A6FB-5A7734CA7CE1}"/>
+              </a:ext>
+            </a:extLst>
+          </p:cNvPr>
+          <p:cNvSpPr/>
+          <p:nvPr/>
+        </p:nvSpPr>
+        <p:spPr>
+          <a:xfrm>
+            <a:off x="3407289" y="2862078"/>
+            <a:ext cx="457197" cy="369329"/>
+          </a:xfrm>
+          <a:prstGeom prst="rect">
+            <a:avLst/>
+          </a:prstGeom>
+          <a:solidFill>
+            <a:srgbClr val="FF0000"/>
+          </a:solidFill>
+        </p:spPr>
+        <p:style>
+          <a:lnRef idx="2">
+            <a:schemeClr val="accent1">
+              <a:shade val="15000"/>
+            </a:schemeClr>
+          </a:lnRef>
+          <a:fillRef idx="1">
+            <a:schemeClr val="accent1"/>
+          </a:fillRef>
+          <a:effectRef idx="0">
+            <a:schemeClr val="accent1"/>
+          </a:effectRef>
+          <a:fontRef idx="minor">
+            <a:schemeClr val="lt1"/>
+          </a:fontRef>
+        </p:style>
+        <p:txBody>
+          <a:bodyPr rtlCol="0" anchor="ctr"/>
+          <a:lstStyle/>
+          <a:p>
+            <a:pPr algn="ctr"/>
+            <a:endParaRPr lang="en-US"/>
+          </a:p>
+        </p:txBody>
+      </p:sp>
+      <p:sp>
+        <p:nvSpPr>
+          <p:cNvPr id="29" name="Isosceles Triangle 28">
+            <a:extLst>
+              <a:ext uri="{FF2B5EF4-FFF2-40B4-BE49-F238E27FC236}">
+                <a16:creationId xmlns:a16="http://schemas.microsoft.com/office/drawing/2014/main" id="{6136B673-7AB2-366F-3F7D-D822AB8998EA}"/>
+              </a:ext>
+            </a:extLst>
+          </p:cNvPr>
+          <p:cNvSpPr/>
+          <p:nvPr/>
+        </p:nvSpPr>
+        <p:spPr>
+          <a:xfrm rot="5400000">
+            <a:off x="4665407" y="1041483"/>
+            <a:ext cx="472383" cy="286384"/>
+          </a:xfrm>
+          <a:prstGeom prst="triangle">
+            <a:avLst/>
+          </a:prstGeom>
+        </p:spPr>
+        <p:style>
+          <a:lnRef idx="2">
+            <a:schemeClr val="accent1">
+              <a:shade val="15000"/>
+            </a:schemeClr>
+          </a:lnRef>
+          <a:fillRef idx="1">
+            <a:schemeClr val="accent1"/>
+          </a:fillRef>
+          <a:effectRef idx="0">
+            <a:schemeClr val="accent1"/>
+          </a:effectRef>
+          <a:fontRef idx="minor">
+            <a:schemeClr val="lt1"/>
+          </a:fontRef>
+        </p:style>
+        <p:txBody>
+          <a:bodyPr rtlCol="0" anchor="ctr"/>
+          <a:lstStyle/>
+          <a:p>
+            <a:pPr algn="ctr"/>
+            <a:endParaRPr lang="en-US"/>
+          </a:p>
+        </p:txBody>
+      </p:sp>
+      <p:sp>
+        <p:nvSpPr>
+          <p:cNvPr id="30" name="Isosceles Triangle 29">
+            <a:extLst>
+              <a:ext uri="{FF2B5EF4-FFF2-40B4-BE49-F238E27FC236}">
+                <a16:creationId xmlns:a16="http://schemas.microsoft.com/office/drawing/2014/main" id="{4F85BC04-D980-6536-443C-A6174292F5E8}"/>
+              </a:ext>
+            </a:extLst>
+          </p:cNvPr>
+          <p:cNvSpPr/>
+          <p:nvPr/>
+        </p:nvSpPr>
+        <p:spPr>
+          <a:xfrm rot="5400000">
+            <a:off x="4648437" y="1688995"/>
+            <a:ext cx="472383" cy="286384"/>
+          </a:xfrm>
+          <a:prstGeom prst="triangle">
+            <a:avLst/>
+          </a:prstGeom>
+        </p:spPr>
+        <p:style>
+          <a:lnRef idx="2">
+            <a:schemeClr val="accent1">
+              <a:shade val="15000"/>
+            </a:schemeClr>
+          </a:lnRef>
+          <a:fillRef idx="1">
+            <a:schemeClr val="accent1"/>
+          </a:fillRef>
+          <a:effectRef idx="0">
+            <a:schemeClr val="accent1"/>
+          </a:effectRef>
+          <a:fontRef idx="minor">
+            <a:schemeClr val="lt1"/>
+          </a:fontRef>
+        </p:style>
+        <p:txBody>
+          <a:bodyPr rtlCol="0" anchor="ctr"/>
+          <a:lstStyle/>
+          <a:p>
+            <a:pPr algn="ctr"/>
+            <a:endParaRPr lang="en-US"/>
+          </a:p>
+        </p:txBody>
+      </p:sp>
+      <p:sp>
+        <p:nvSpPr>
+          <p:cNvPr id="31" name="Isosceles Triangle 30">
+            <a:extLst>
+              <a:ext uri="{FF2B5EF4-FFF2-40B4-BE49-F238E27FC236}">
+                <a16:creationId xmlns:a16="http://schemas.microsoft.com/office/drawing/2014/main" id="{A41D649C-4013-89C3-205B-4C73866AB562}"/>
+              </a:ext>
+            </a:extLst>
+          </p:cNvPr>
+          <p:cNvSpPr/>
+          <p:nvPr/>
+        </p:nvSpPr>
+        <p:spPr>
+          <a:xfrm rot="5400000">
+            <a:off x="4665407" y="2355989"/>
+            <a:ext cx="472383" cy="286384"/>
+          </a:xfrm>
+          <a:prstGeom prst="triangle">
+            <a:avLst/>
+          </a:prstGeom>
+        </p:spPr>
+        <p:style>
+          <a:lnRef idx="2">
+            <a:schemeClr val="accent1">
+              <a:shade val="15000"/>
+            </a:schemeClr>
+          </a:lnRef>
+          <a:fillRef idx="1">
+            <a:schemeClr val="accent1"/>
+          </a:fillRef>
+          <a:effectRef idx="0">
+            <a:schemeClr val="accent1"/>
+          </a:effectRef>
+          <a:fontRef idx="minor">
+            <a:schemeClr val="lt1"/>
+          </a:fontRef>
+        </p:style>
+        <p:txBody>
+          <a:bodyPr rtlCol="0" anchor="ctr"/>
+          <a:lstStyle/>
+          <a:p>
+            <a:pPr algn="ctr"/>
+            <a:endParaRPr lang="en-US"/>
+          </a:p>
+        </p:txBody>
+      </p:sp>
+      <p:sp>
+        <p:nvSpPr>
+          <p:cNvPr id="32" name="Isosceles Triangle 31">
+            <a:extLst>
+              <a:ext uri="{FF2B5EF4-FFF2-40B4-BE49-F238E27FC236}">
+                <a16:creationId xmlns:a16="http://schemas.microsoft.com/office/drawing/2014/main" id="{A0BDFFDE-826B-B762-A381-146F43F80036}"/>
+              </a:ext>
+            </a:extLst>
+          </p:cNvPr>
+          <p:cNvSpPr/>
+          <p:nvPr/>
+        </p:nvSpPr>
+        <p:spPr>
+          <a:xfrm rot="5400000">
+            <a:off x="4687756" y="3136323"/>
+            <a:ext cx="472383" cy="286384"/>
+          </a:xfrm>
+          <a:prstGeom prst="triangle">
+            <a:avLst/>
+          </a:prstGeom>
+        </p:spPr>
+        <p:style>
+          <a:lnRef idx="2">
+            <a:schemeClr val="accent1">
+              <a:shade val="15000"/>
+            </a:schemeClr>
+          </a:lnRef>
+          <a:fillRef idx="1">
+            <a:schemeClr val="accent1"/>
+          </a:fillRef>
+          <a:effectRef idx="0">
+            <a:schemeClr val="accent1"/>
+          </a:effectRef>
+          <a:fontRef idx="minor">
+            <a:schemeClr val="lt1"/>
+          </a:fontRef>
+        </p:style>
+        <p:txBody>
+          <a:bodyPr rtlCol="0" anchor="ctr"/>
+          <a:lstStyle/>
+          <a:p>
+            <a:pPr algn="ctr"/>
+            <a:endParaRPr lang="en-US"/>
+          </a:p>
+        </p:txBody>
+      </p:sp>
+      <p:sp>
+        <p:nvSpPr>
+          <p:cNvPr id="33" name="Isosceles Triangle 32">
+            <a:extLst>
+              <a:ext uri="{FF2B5EF4-FFF2-40B4-BE49-F238E27FC236}">
+                <a16:creationId xmlns:a16="http://schemas.microsoft.com/office/drawing/2014/main" id="{AF5328B2-8CA4-E823-AD74-4662F4878A55}"/>
+              </a:ext>
+            </a:extLst>
+          </p:cNvPr>
+          <p:cNvSpPr/>
+          <p:nvPr/>
+        </p:nvSpPr>
+        <p:spPr>
+          <a:xfrm rot="5400000">
+            <a:off x="6432422" y="804514"/>
+            <a:ext cx="1418928" cy="955406"/>
+          </a:xfrm>
+          <a:prstGeom prst="triangle">
+            <a:avLst/>
+          </a:prstGeom>
+        </p:spPr>
+        <p:style>
+          <a:lnRef idx="2">
+            <a:schemeClr val="accent1">
+              <a:shade val="15000"/>
+            </a:schemeClr>
+          </a:lnRef>
+          <a:fillRef idx="1">
+            <a:schemeClr val="accent1"/>
+          </a:fillRef>
+          <a:effectRef idx="0">
+            <a:schemeClr val="accent1"/>
+          </a:effectRef>
+          <a:fontRef idx="minor">
+            <a:schemeClr val="lt1"/>
+          </a:fontRef>
+        </p:style>
+        <p:txBody>
+          <a:bodyPr rtlCol="0" anchor="ctr"/>
+          <a:lstStyle/>
+          <a:p>
+            <a:pPr algn="ctr"/>
+            <a:endParaRPr lang="en-US"/>
+          </a:p>
+        </p:txBody>
+      </p:sp>
+      <p:sp>
+        <p:nvSpPr>
+          <p:cNvPr id="36" name="TextBox 35">
+            <a:extLst>
+              <a:ext uri="{FF2B5EF4-FFF2-40B4-BE49-F238E27FC236}">
+                <a16:creationId xmlns:a16="http://schemas.microsoft.com/office/drawing/2014/main" id="{0B203E25-5768-63BD-52BF-38BCEE8E0541}"/>
+              </a:ext>
+            </a:extLst>
+          </p:cNvPr>
+          <p:cNvSpPr txBox="1"/>
+          <p:nvPr/>
+        </p:nvSpPr>
+        <p:spPr>
+          <a:xfrm>
+            <a:off x="1895802" y="572753"/>
+            <a:ext cx="1063187" cy="261610"/>
+          </a:xfrm>
+          <a:prstGeom prst="rect">
+            <a:avLst/>
+          </a:prstGeom>
+          <a:noFill/>
+        </p:spPr>
+        <p:txBody>
+          <a:bodyPr wrap="square">
+            <a:spAutoFit/>
+          </a:bodyPr>
+          <a:lstStyle/>
+          <a:p>
+            <a:r>
+              <a:rPr lang="en-US" sz="1100" b="1" dirty="0"/>
+              <a:t>75 ohm </a:t>
+            </a:r>
+            <a:endParaRPr lang="en-US" sz="1100" dirty="0"/>
+          </a:p>
+        </p:txBody>
+      </p:sp>
+      <p:sp>
+        <p:nvSpPr>
+          <p:cNvPr id="40" name="TextBox 39">
+            <a:extLst>
+              <a:ext uri="{FF2B5EF4-FFF2-40B4-BE49-F238E27FC236}">
+                <a16:creationId xmlns:a16="http://schemas.microsoft.com/office/drawing/2014/main" id="{42BCACE0-6AD3-C4B3-6017-1CCC02FB63A9}"/>
+              </a:ext>
+            </a:extLst>
+          </p:cNvPr>
+          <p:cNvSpPr txBox="1"/>
+          <p:nvPr/>
+        </p:nvSpPr>
+        <p:spPr>
+          <a:xfrm>
+            <a:off x="2745576" y="535362"/>
+            <a:ext cx="1961111" cy="246221"/>
+          </a:xfrm>
+          <a:prstGeom prst="rect">
+            <a:avLst/>
+          </a:prstGeom>
+          <a:noFill/>
+        </p:spPr>
+        <p:txBody>
+          <a:bodyPr wrap="square" rtlCol="0">
+            <a:spAutoFit/>
+          </a:bodyPr>
+          <a:lstStyle/>
+          <a:p>
+            <a:r>
+              <a:rPr lang="en-US" sz="1000" b="1" dirty="0"/>
+              <a:t>Strain Gauge (0.4 ohm – 1.2 ohm)</a:t>
+            </a:r>
+          </a:p>
+        </p:txBody>
+      </p:sp>
+      <p:sp>
+        <p:nvSpPr>
+          <p:cNvPr id="41" name="TextBox 40">
+            <a:extLst>
+              <a:ext uri="{FF2B5EF4-FFF2-40B4-BE49-F238E27FC236}">
+                <a16:creationId xmlns:a16="http://schemas.microsoft.com/office/drawing/2014/main" id="{E52AEF33-8944-BBA7-B6CA-F1DB6CBA0343}"/>
+              </a:ext>
+            </a:extLst>
+          </p:cNvPr>
+          <p:cNvSpPr txBox="1"/>
+          <p:nvPr/>
+        </p:nvSpPr>
+        <p:spPr>
+          <a:xfrm>
+            <a:off x="1855130" y="1213550"/>
+            <a:ext cx="1063187" cy="261610"/>
+          </a:xfrm>
+          <a:prstGeom prst="rect">
+            <a:avLst/>
+          </a:prstGeom>
+          <a:noFill/>
+        </p:spPr>
+        <p:txBody>
+          <a:bodyPr wrap="square">
+            <a:spAutoFit/>
+          </a:bodyPr>
+          <a:lstStyle/>
+          <a:p>
+            <a:r>
+              <a:rPr lang="en-US" sz="1100" b="1" dirty="0"/>
+              <a:t>75 ohm </a:t>
+            </a:r>
+            <a:endParaRPr lang="en-US" sz="1100" dirty="0"/>
+          </a:p>
+        </p:txBody>
+      </p:sp>
+      <p:sp>
+        <p:nvSpPr>
+          <p:cNvPr id="42" name="TextBox 41">
+            <a:extLst>
+              <a:ext uri="{FF2B5EF4-FFF2-40B4-BE49-F238E27FC236}">
+                <a16:creationId xmlns:a16="http://schemas.microsoft.com/office/drawing/2014/main" id="{DF7DC70D-B8BD-A7A0-C6E7-AF9273BFE62B}"/>
+              </a:ext>
+            </a:extLst>
+          </p:cNvPr>
+          <p:cNvSpPr txBox="1"/>
+          <p:nvPr/>
+        </p:nvSpPr>
+        <p:spPr>
+          <a:xfrm>
+            <a:off x="1855130" y="1854686"/>
+            <a:ext cx="1063187" cy="261610"/>
+          </a:xfrm>
+          <a:prstGeom prst="rect">
+            <a:avLst/>
+          </a:prstGeom>
+          <a:noFill/>
+        </p:spPr>
+        <p:txBody>
+          <a:bodyPr wrap="square">
+            <a:spAutoFit/>
+          </a:bodyPr>
+          <a:lstStyle/>
+          <a:p>
+            <a:r>
+              <a:rPr lang="en-US" sz="1100" b="1" dirty="0"/>
+              <a:t>75 ohm </a:t>
+            </a:r>
+            <a:endParaRPr lang="en-US" sz="1100" dirty="0"/>
+          </a:p>
+        </p:txBody>
+      </p:sp>
+      <p:sp>
+        <p:nvSpPr>
+          <p:cNvPr id="43" name="TextBox 42">
+            <a:extLst>
+              <a:ext uri="{FF2B5EF4-FFF2-40B4-BE49-F238E27FC236}">
+                <a16:creationId xmlns:a16="http://schemas.microsoft.com/office/drawing/2014/main" id="{D0875418-C307-4A5B-84D3-63243FA93AF2}"/>
+              </a:ext>
+            </a:extLst>
+          </p:cNvPr>
+          <p:cNvSpPr txBox="1"/>
+          <p:nvPr/>
+        </p:nvSpPr>
+        <p:spPr>
+          <a:xfrm>
+            <a:off x="1855130" y="2629933"/>
+            <a:ext cx="1063187" cy="261610"/>
+          </a:xfrm>
+          <a:prstGeom prst="rect">
+            <a:avLst/>
+          </a:prstGeom>
+          <a:noFill/>
+        </p:spPr>
+        <p:txBody>
+          <a:bodyPr wrap="square">
+            <a:spAutoFit/>
+          </a:bodyPr>
+          <a:lstStyle/>
+          <a:p>
+            <a:r>
+              <a:rPr lang="en-US" sz="1100" b="1" dirty="0"/>
+              <a:t>75 ohm </a:t>
+            </a:r>
+            <a:endParaRPr lang="en-US" sz="1100" dirty="0"/>
+          </a:p>
+        </p:txBody>
+      </p:sp>
+      <p:sp>
+        <p:nvSpPr>
+          <p:cNvPr id="44" name="TextBox 43">
+            <a:extLst>
+              <a:ext uri="{FF2B5EF4-FFF2-40B4-BE49-F238E27FC236}">
+                <a16:creationId xmlns:a16="http://schemas.microsoft.com/office/drawing/2014/main" id="{5BCAA173-7545-461B-62C3-909788B5C86D}"/>
+              </a:ext>
+            </a:extLst>
+          </p:cNvPr>
+          <p:cNvSpPr txBox="1"/>
+          <p:nvPr/>
+        </p:nvSpPr>
+        <p:spPr>
+          <a:xfrm>
+            <a:off x="2725240" y="1176846"/>
+            <a:ext cx="1961111" cy="246221"/>
+          </a:xfrm>
+          <a:prstGeom prst="rect">
+            <a:avLst/>
+          </a:prstGeom>
+          <a:noFill/>
+        </p:spPr>
+        <p:txBody>
+          <a:bodyPr wrap="square" rtlCol="0">
+            <a:spAutoFit/>
+          </a:bodyPr>
+          <a:lstStyle/>
+          <a:p>
+            <a:r>
+              <a:rPr lang="en-US" sz="1000" b="1" dirty="0"/>
+              <a:t>Strain Gauge (0.4 ohm – 1.2 ohm)</a:t>
+            </a:r>
+          </a:p>
+        </p:txBody>
+      </p:sp>
+      <p:sp>
+        <p:nvSpPr>
+          <p:cNvPr id="45" name="TextBox 44">
+            <a:extLst>
+              <a:ext uri="{FF2B5EF4-FFF2-40B4-BE49-F238E27FC236}">
+                <a16:creationId xmlns:a16="http://schemas.microsoft.com/office/drawing/2014/main" id="{39210EB9-73E1-78B8-5E21-3C25800571B6}"/>
+              </a:ext>
+            </a:extLst>
+          </p:cNvPr>
+          <p:cNvSpPr txBox="1"/>
+          <p:nvPr/>
+        </p:nvSpPr>
+        <p:spPr>
+          <a:xfrm>
+            <a:off x="2725240" y="1843456"/>
+            <a:ext cx="1961111" cy="246221"/>
+          </a:xfrm>
+          <a:prstGeom prst="rect">
+            <a:avLst/>
+          </a:prstGeom>
+          <a:noFill/>
+        </p:spPr>
+        <p:txBody>
+          <a:bodyPr wrap="square" rtlCol="0">
+            <a:spAutoFit/>
+          </a:bodyPr>
+          <a:lstStyle/>
+          <a:p>
+            <a:r>
+              <a:rPr lang="en-US" sz="1000" b="1" dirty="0"/>
+              <a:t>Strain Gauge (0.4 ohm – 1.2 ohm)</a:t>
+            </a:r>
+          </a:p>
+        </p:txBody>
+      </p:sp>
+      <p:sp>
+        <p:nvSpPr>
+          <p:cNvPr id="46" name="TextBox 45">
+            <a:extLst>
+              <a:ext uri="{FF2B5EF4-FFF2-40B4-BE49-F238E27FC236}">
+                <a16:creationId xmlns:a16="http://schemas.microsoft.com/office/drawing/2014/main" id="{6D36B43E-AA2C-9595-842F-0C91086E6643}"/>
+              </a:ext>
+            </a:extLst>
+          </p:cNvPr>
+          <p:cNvSpPr txBox="1"/>
+          <p:nvPr/>
+        </p:nvSpPr>
+        <p:spPr>
+          <a:xfrm>
+            <a:off x="2684513" y="2539489"/>
+            <a:ext cx="1961111" cy="246221"/>
+          </a:xfrm>
+          <a:prstGeom prst="rect">
+            <a:avLst/>
+          </a:prstGeom>
+          <a:noFill/>
+        </p:spPr>
+        <p:txBody>
+          <a:bodyPr wrap="square" rtlCol="0">
+            <a:spAutoFit/>
+          </a:bodyPr>
+          <a:lstStyle/>
+          <a:p>
+            <a:r>
+              <a:rPr lang="en-US" sz="1000" b="1" dirty="0"/>
+              <a:t>Strain Gauge (0.4 ohm – 1.2 ohm)</a:t>
+            </a:r>
+          </a:p>
+        </p:txBody>
+      </p:sp>
+      <p:sp>
+        <p:nvSpPr>
+          <p:cNvPr id="47" name="TextBox 46">
+            <a:extLst>
+              <a:ext uri="{FF2B5EF4-FFF2-40B4-BE49-F238E27FC236}">
+                <a16:creationId xmlns:a16="http://schemas.microsoft.com/office/drawing/2014/main" id="{297A55A5-F61F-D594-EE84-9E0B2707FC3C}"/>
+              </a:ext>
+            </a:extLst>
+          </p:cNvPr>
+          <p:cNvSpPr txBox="1"/>
+          <p:nvPr/>
+        </p:nvSpPr>
+        <p:spPr>
+          <a:xfrm>
+            <a:off x="3878598" y="879043"/>
+            <a:ext cx="760614" cy="276999"/>
+          </a:xfrm>
+          <a:prstGeom prst="rect">
+            <a:avLst/>
+          </a:prstGeom>
+          <a:noFill/>
+        </p:spPr>
+        <p:txBody>
+          <a:bodyPr wrap="square" rtlCol="0">
+            <a:spAutoFit/>
+          </a:bodyPr>
+          <a:lstStyle/>
+          <a:p>
+            <a:r>
+              <a:rPr lang="en-US" sz="1200" dirty="0"/>
+              <a:t>GND</a:t>
+            </a:r>
+          </a:p>
+        </p:txBody>
+      </p:sp>
+      <p:sp>
+        <p:nvSpPr>
+          <p:cNvPr id="48" name="TextBox 47">
+            <a:extLst>
+              <a:ext uri="{FF2B5EF4-FFF2-40B4-BE49-F238E27FC236}">
+                <a16:creationId xmlns:a16="http://schemas.microsoft.com/office/drawing/2014/main" id="{10571970-6DA9-225E-8834-A3EE88104997}"/>
+              </a:ext>
+            </a:extLst>
+          </p:cNvPr>
+          <p:cNvSpPr txBox="1"/>
+          <p:nvPr/>
+        </p:nvSpPr>
+        <p:spPr>
+          <a:xfrm>
+            <a:off x="3864486" y="1440218"/>
+            <a:ext cx="760614" cy="276999"/>
+          </a:xfrm>
+          <a:prstGeom prst="rect">
+            <a:avLst/>
+          </a:prstGeom>
+          <a:noFill/>
+        </p:spPr>
+        <p:txBody>
+          <a:bodyPr wrap="square" rtlCol="0">
+            <a:spAutoFit/>
+          </a:bodyPr>
+          <a:lstStyle/>
+          <a:p>
+            <a:r>
+              <a:rPr lang="en-US" sz="1200" dirty="0"/>
+              <a:t>GND</a:t>
+            </a:r>
+          </a:p>
+        </p:txBody>
+      </p:sp>
+      <p:sp>
+        <p:nvSpPr>
+          <p:cNvPr id="49" name="TextBox 48">
+            <a:extLst>
+              <a:ext uri="{FF2B5EF4-FFF2-40B4-BE49-F238E27FC236}">
+                <a16:creationId xmlns:a16="http://schemas.microsoft.com/office/drawing/2014/main" id="{A4898651-6771-3C0A-50A0-A3A5E5C58855}"/>
+              </a:ext>
+            </a:extLst>
+          </p:cNvPr>
+          <p:cNvSpPr txBox="1"/>
+          <p:nvPr/>
+        </p:nvSpPr>
+        <p:spPr>
+          <a:xfrm>
+            <a:off x="3853682" y="2104828"/>
+            <a:ext cx="760614" cy="276999"/>
+          </a:xfrm>
+          <a:prstGeom prst="rect">
+            <a:avLst/>
+          </a:prstGeom>
+          <a:noFill/>
+        </p:spPr>
+        <p:txBody>
+          <a:bodyPr wrap="square" rtlCol="0">
+            <a:spAutoFit/>
+          </a:bodyPr>
+          <a:lstStyle/>
+          <a:p>
+            <a:r>
+              <a:rPr lang="en-US" sz="1200" dirty="0"/>
+              <a:t>GND</a:t>
+            </a:r>
+          </a:p>
+        </p:txBody>
+      </p:sp>
+      <p:sp>
+        <p:nvSpPr>
+          <p:cNvPr id="50" name="TextBox 49">
+            <a:extLst>
+              <a:ext uri="{FF2B5EF4-FFF2-40B4-BE49-F238E27FC236}">
+                <a16:creationId xmlns:a16="http://schemas.microsoft.com/office/drawing/2014/main" id="{40A07E44-D155-92F2-E9CB-0DFAC3C597C3}"/>
+              </a:ext>
+            </a:extLst>
+          </p:cNvPr>
+          <p:cNvSpPr txBox="1"/>
+          <p:nvPr/>
+        </p:nvSpPr>
+        <p:spPr>
+          <a:xfrm>
+            <a:off x="3853680" y="2908242"/>
+            <a:ext cx="760614" cy="276999"/>
+          </a:xfrm>
+          <a:prstGeom prst="rect">
+            <a:avLst/>
+          </a:prstGeom>
+          <a:noFill/>
+        </p:spPr>
+        <p:txBody>
+          <a:bodyPr wrap="square" rtlCol="0">
+            <a:spAutoFit/>
+          </a:bodyPr>
+          <a:lstStyle/>
+          <a:p>
+            <a:r>
+              <a:rPr lang="en-US" sz="1200" dirty="0"/>
+              <a:t>GND</a:t>
+            </a:r>
+          </a:p>
+        </p:txBody>
+      </p:sp>
+      <p:cxnSp>
+        <p:nvCxnSpPr>
+          <p:cNvPr id="52" name="Straight Connector 51">
+            <a:extLst>
+              <a:ext uri="{FF2B5EF4-FFF2-40B4-BE49-F238E27FC236}">
+                <a16:creationId xmlns:a16="http://schemas.microsoft.com/office/drawing/2014/main" id="{D55B63EF-B7D1-B775-86BE-5470313F2D4D}"/>
+              </a:ext>
+            </a:extLst>
+          </p:cNvPr>
+          <p:cNvCxnSpPr>
+            <a:stCxn id="47" idx="1"/>
+            <a:endCxn id="47" idx="1"/>
+          </p:cNvCxnSpPr>
+          <p:nvPr/>
+        </p:nvCxnSpPr>
+        <p:spPr>
+          <a:xfrm>
+            <a:off x="3878598" y="1017543"/>
+            <a:ext cx="0" cy="0"/>
+          </a:xfrm>
+          <a:prstGeom prst="line">
+            <a:avLst/>
+          </a:prstGeom>
+        </p:spPr>
+        <p:style>
+          <a:lnRef idx="1">
+            <a:schemeClr val="accent1"/>
+          </a:lnRef>
+          <a:fillRef idx="0">
+            <a:schemeClr val="accent1"/>
+          </a:fillRef>
+          <a:effectRef idx="0">
+            <a:schemeClr val="accent1"/>
+          </a:effectRef>
+          <a:fontRef idx="minor">
+            <a:schemeClr val="tx1"/>
+          </a:fontRef>
+        </p:style>
+      </p:cxnSp>
+      <p:cxnSp>
+        <p:nvCxnSpPr>
+          <p:cNvPr id="54" name="Straight Connector 53">
+            <a:extLst>
+              <a:ext uri="{FF2B5EF4-FFF2-40B4-BE49-F238E27FC236}">
+                <a16:creationId xmlns:a16="http://schemas.microsoft.com/office/drawing/2014/main" id="{51CEF0CC-5520-D28C-4458-3295590C5D7A}"/>
+              </a:ext>
+            </a:extLst>
+          </p:cNvPr>
+          <p:cNvCxnSpPr/>
+          <p:nvPr/>
+        </p:nvCxnSpPr>
+        <p:spPr>
+          <a:xfrm>
+            <a:off x="3116595" y="974199"/>
+            <a:ext cx="0" cy="2415387"/>
+          </a:xfrm>
+          <a:prstGeom prst="line">
+            <a:avLst/>
+          </a:prstGeom>
+        </p:spPr>
+        <p:style>
+          <a:lnRef idx="1">
+            <a:schemeClr val="accent1"/>
+          </a:lnRef>
+          <a:fillRef idx="0">
+            <a:schemeClr val="accent1"/>
+          </a:fillRef>
+          <a:effectRef idx="0">
+            <a:schemeClr val="accent1"/>
+          </a:effectRef>
+          <a:fontRef idx="minor">
+            <a:schemeClr val="tx1"/>
+          </a:fontRef>
+        </p:style>
+      </p:cxnSp>
+      <p:cxnSp>
+        <p:nvCxnSpPr>
+          <p:cNvPr id="56" name="Straight Connector 55">
+            <a:extLst>
+              <a:ext uri="{FF2B5EF4-FFF2-40B4-BE49-F238E27FC236}">
+                <a16:creationId xmlns:a16="http://schemas.microsoft.com/office/drawing/2014/main" id="{80DB1E0A-1B02-3B52-D9DC-4BBEF606DFF4}"/>
+              </a:ext>
+            </a:extLst>
+          </p:cNvPr>
+          <p:cNvCxnSpPr/>
+          <p:nvPr/>
+        </p:nvCxnSpPr>
+        <p:spPr>
+          <a:xfrm flipV="1">
+            <a:off x="3116595" y="1208374"/>
+            <a:ext cx="1624841" cy="10371"/>
+          </a:xfrm>
+          <a:prstGeom prst="line">
+            <a:avLst/>
+          </a:prstGeom>
+        </p:spPr>
+        <p:style>
+          <a:lnRef idx="1">
+            <a:schemeClr val="accent1"/>
+          </a:lnRef>
+          <a:fillRef idx="0">
+            <a:schemeClr val="accent1"/>
+          </a:fillRef>
+          <a:effectRef idx="0">
+            <a:schemeClr val="accent1"/>
+          </a:effectRef>
+          <a:fontRef idx="minor">
+            <a:schemeClr val="tx1"/>
+          </a:fontRef>
+        </p:style>
+      </p:cxnSp>
+      <p:cxnSp>
+        <p:nvCxnSpPr>
+          <p:cNvPr id="57" name="Straight Connector 56">
+            <a:extLst>
+              <a:ext uri="{FF2B5EF4-FFF2-40B4-BE49-F238E27FC236}">
+                <a16:creationId xmlns:a16="http://schemas.microsoft.com/office/drawing/2014/main" id="{3101572E-D6F4-1E5C-38D9-BBC86F8E5FAB}"/>
+              </a:ext>
+            </a:extLst>
+          </p:cNvPr>
+          <p:cNvCxnSpPr/>
+          <p:nvPr/>
+        </p:nvCxnSpPr>
+        <p:spPr>
+          <a:xfrm flipV="1">
+            <a:off x="3116594" y="1858441"/>
+            <a:ext cx="1624841" cy="10371"/>
+          </a:xfrm>
+          <a:prstGeom prst="line">
+            <a:avLst/>
+          </a:prstGeom>
+        </p:spPr>
+        <p:style>
+          <a:lnRef idx="1">
+            <a:schemeClr val="accent1"/>
+          </a:lnRef>
+          <a:fillRef idx="0">
+            <a:schemeClr val="accent1"/>
+          </a:fillRef>
+          <a:effectRef idx="0">
+            <a:schemeClr val="accent1"/>
+          </a:effectRef>
+          <a:fontRef idx="minor">
+            <a:schemeClr val="tx1"/>
+          </a:fontRef>
+        </p:style>
+      </p:cxnSp>
+      <p:cxnSp>
+        <p:nvCxnSpPr>
+          <p:cNvPr id="58" name="Straight Connector 57">
+            <a:extLst>
+              <a:ext uri="{FF2B5EF4-FFF2-40B4-BE49-F238E27FC236}">
+                <a16:creationId xmlns:a16="http://schemas.microsoft.com/office/drawing/2014/main" id="{EBD6EC82-762F-C9F2-E10E-351B2EFC0218}"/>
+              </a:ext>
+            </a:extLst>
+          </p:cNvPr>
+          <p:cNvCxnSpPr/>
+          <p:nvPr/>
+        </p:nvCxnSpPr>
+        <p:spPr>
+          <a:xfrm flipV="1">
+            <a:off x="3125080" y="2511222"/>
+            <a:ext cx="1624841" cy="10371"/>
+          </a:xfrm>
+          <a:prstGeom prst="line">
+            <a:avLst/>
+          </a:prstGeom>
+        </p:spPr>
+        <p:style>
+          <a:lnRef idx="1">
+            <a:schemeClr val="accent1"/>
+          </a:lnRef>
+          <a:fillRef idx="0">
+            <a:schemeClr val="accent1"/>
+          </a:fillRef>
+          <a:effectRef idx="0">
+            <a:schemeClr val="accent1"/>
+          </a:effectRef>
+          <a:fontRef idx="minor">
+            <a:schemeClr val="tx1"/>
+          </a:fontRef>
+        </p:style>
+      </p:cxnSp>
+      <p:cxnSp>
+        <p:nvCxnSpPr>
+          <p:cNvPr id="59" name="Straight Connector 58">
+            <a:extLst>
+              <a:ext uri="{FF2B5EF4-FFF2-40B4-BE49-F238E27FC236}">
+                <a16:creationId xmlns:a16="http://schemas.microsoft.com/office/drawing/2014/main" id="{9CA8189F-A287-7DF0-392B-F7A203229D4F}"/>
+              </a:ext>
+            </a:extLst>
+          </p:cNvPr>
+          <p:cNvCxnSpPr/>
+          <p:nvPr/>
+        </p:nvCxnSpPr>
+        <p:spPr>
+          <a:xfrm flipV="1">
+            <a:off x="3116593" y="3280008"/>
+            <a:ext cx="1624841" cy="10371"/>
+          </a:xfrm>
+          <a:prstGeom prst="line">
+            <a:avLst/>
+          </a:prstGeom>
+        </p:spPr>
+        <p:style>
+          <a:lnRef idx="1">
+            <a:schemeClr val="accent1"/>
+          </a:lnRef>
+          <a:fillRef idx="0">
+            <a:schemeClr val="accent1"/>
+          </a:fillRef>
+          <a:effectRef idx="0">
+            <a:schemeClr val="accent1"/>
+          </a:effectRef>
+          <a:fontRef idx="minor">
+            <a:schemeClr val="tx1"/>
+          </a:fontRef>
+        </p:style>
+      </p:cxnSp>
+      <p:sp>
+        <p:nvSpPr>
+          <p:cNvPr id="62" name="TextBox 61">
+            <a:extLst>
+              <a:ext uri="{FF2B5EF4-FFF2-40B4-BE49-F238E27FC236}">
+                <a16:creationId xmlns:a16="http://schemas.microsoft.com/office/drawing/2014/main" id="{D1A162BD-D181-74C0-F2ED-C19C7E356584}"/>
+              </a:ext>
+            </a:extLst>
+          </p:cNvPr>
+          <p:cNvSpPr txBox="1"/>
+          <p:nvPr/>
+        </p:nvSpPr>
+        <p:spPr>
+          <a:xfrm>
+            <a:off x="4639212" y="3515707"/>
+            <a:ext cx="1662730" cy="523220"/>
+          </a:xfrm>
+          <a:prstGeom prst="rect">
+            <a:avLst/>
+          </a:prstGeom>
+          <a:noFill/>
+        </p:spPr>
+        <p:txBody>
+          <a:bodyPr wrap="square" rtlCol="0">
+            <a:spAutoFit/>
+          </a:bodyPr>
+          <a:lstStyle/>
+          <a:p>
+            <a:r>
+              <a:rPr lang="en-US" sz="1400" b="1" dirty="0"/>
+              <a:t>X76 (LMC6482 or OPA333)</a:t>
+            </a:r>
+          </a:p>
+        </p:txBody>
+      </p:sp>
+      <p:cxnSp>
+        <p:nvCxnSpPr>
+          <p:cNvPr id="63" name="Straight Connector 62">
+            <a:extLst>
+              <a:ext uri="{FF2B5EF4-FFF2-40B4-BE49-F238E27FC236}">
+                <a16:creationId xmlns:a16="http://schemas.microsoft.com/office/drawing/2014/main" id="{7AC047CF-F680-B1AC-35ED-6CD8B19B0969}"/>
+              </a:ext>
+            </a:extLst>
+          </p:cNvPr>
+          <p:cNvCxnSpPr/>
+          <p:nvPr/>
+        </p:nvCxnSpPr>
+        <p:spPr>
+          <a:xfrm flipV="1">
+            <a:off x="5027821" y="1174304"/>
+            <a:ext cx="1624841" cy="10371"/>
+          </a:xfrm>
+          <a:prstGeom prst="line">
+            <a:avLst/>
+          </a:prstGeom>
+        </p:spPr>
+        <p:style>
+          <a:lnRef idx="1">
+            <a:schemeClr val="accent1"/>
+          </a:lnRef>
+          <a:fillRef idx="0">
+            <a:schemeClr val="accent1"/>
+          </a:fillRef>
+          <a:effectRef idx="0">
+            <a:schemeClr val="accent1"/>
+          </a:effectRef>
+          <a:fontRef idx="minor">
+            <a:schemeClr val="tx1"/>
+          </a:fontRef>
+        </p:style>
+      </p:cxnSp>
+      <p:cxnSp>
+        <p:nvCxnSpPr>
+          <p:cNvPr id="64" name="Straight Connector 63">
+            <a:extLst>
+              <a:ext uri="{FF2B5EF4-FFF2-40B4-BE49-F238E27FC236}">
+                <a16:creationId xmlns:a16="http://schemas.microsoft.com/office/drawing/2014/main" id="{7799C66B-AB10-E22B-DAB1-937DF97F7A44}"/>
+              </a:ext>
+            </a:extLst>
+          </p:cNvPr>
+          <p:cNvCxnSpPr/>
+          <p:nvPr/>
+        </p:nvCxnSpPr>
+        <p:spPr>
+          <a:xfrm flipV="1">
+            <a:off x="5044791" y="1821816"/>
+            <a:ext cx="1624841" cy="10371"/>
+          </a:xfrm>
+          <a:prstGeom prst="line">
+            <a:avLst/>
+          </a:prstGeom>
+        </p:spPr>
+        <p:style>
+          <a:lnRef idx="1">
+            <a:schemeClr val="accent1"/>
+          </a:lnRef>
+          <a:fillRef idx="0">
+            <a:schemeClr val="accent1"/>
+          </a:fillRef>
+          <a:effectRef idx="0">
+            <a:schemeClr val="accent1"/>
+          </a:effectRef>
+          <a:fontRef idx="minor">
+            <a:schemeClr val="tx1"/>
+          </a:fontRef>
+        </p:style>
+      </p:cxnSp>
+      <p:cxnSp>
+        <p:nvCxnSpPr>
+          <p:cNvPr id="65" name="Straight Connector 64">
+            <a:extLst>
+              <a:ext uri="{FF2B5EF4-FFF2-40B4-BE49-F238E27FC236}">
+                <a16:creationId xmlns:a16="http://schemas.microsoft.com/office/drawing/2014/main" id="{41FAB72E-2D32-2A8F-F068-0EA6DCFD4829}"/>
+              </a:ext>
+            </a:extLst>
+          </p:cNvPr>
+          <p:cNvCxnSpPr>
+            <a:cxnSpLocks/>
+          </p:cNvCxnSpPr>
+          <p:nvPr/>
+        </p:nvCxnSpPr>
+        <p:spPr>
+          <a:xfrm>
+            <a:off x="6034252" y="1564470"/>
+            <a:ext cx="604297" cy="0"/>
+          </a:xfrm>
+          <a:prstGeom prst="line">
+            <a:avLst/>
+          </a:prstGeom>
+        </p:spPr>
+        <p:style>
+          <a:lnRef idx="1">
+            <a:schemeClr val="accent1"/>
+          </a:lnRef>
+          <a:fillRef idx="0">
+            <a:schemeClr val="accent1"/>
+          </a:fillRef>
+          <a:effectRef idx="0">
+            <a:schemeClr val="accent1"/>
+          </a:effectRef>
+          <a:fontRef idx="minor">
+            <a:schemeClr val="tx1"/>
+          </a:fontRef>
+        </p:style>
+      </p:cxnSp>
+      <p:cxnSp>
+        <p:nvCxnSpPr>
+          <p:cNvPr id="68" name="Straight Connector 67">
+            <a:extLst>
+              <a:ext uri="{FF2B5EF4-FFF2-40B4-BE49-F238E27FC236}">
+                <a16:creationId xmlns:a16="http://schemas.microsoft.com/office/drawing/2014/main" id="{D85E4E75-D735-43FF-D148-430E2C2E40BD}"/>
+              </a:ext>
+            </a:extLst>
+          </p:cNvPr>
+          <p:cNvCxnSpPr>
+            <a:cxnSpLocks/>
+          </p:cNvCxnSpPr>
+          <p:nvPr/>
+        </p:nvCxnSpPr>
+        <p:spPr>
+          <a:xfrm>
+            <a:off x="6034252" y="868672"/>
+            <a:ext cx="651602" cy="0"/>
+          </a:xfrm>
+          <a:prstGeom prst="line">
+            <a:avLst/>
+          </a:prstGeom>
+        </p:spPr>
+        <p:style>
+          <a:lnRef idx="1">
+            <a:schemeClr val="accent1"/>
+          </a:lnRef>
+          <a:fillRef idx="0">
+            <a:schemeClr val="accent1"/>
+          </a:fillRef>
+          <a:effectRef idx="0">
+            <a:schemeClr val="accent1"/>
+          </a:effectRef>
+          <a:fontRef idx="minor">
+            <a:schemeClr val="tx1"/>
+          </a:fontRef>
+        </p:style>
+      </p:cxnSp>
+      <p:sp>
+        <p:nvSpPr>
+          <p:cNvPr id="71" name="TextBox 70">
+            <a:extLst>
+              <a:ext uri="{FF2B5EF4-FFF2-40B4-BE49-F238E27FC236}">
+                <a16:creationId xmlns:a16="http://schemas.microsoft.com/office/drawing/2014/main" id="{A345EB01-0E6E-D546-32F2-E6A0CD1F200A}"/>
+              </a:ext>
+            </a:extLst>
+          </p:cNvPr>
+          <p:cNvSpPr txBox="1"/>
+          <p:nvPr/>
+        </p:nvSpPr>
+        <p:spPr>
+          <a:xfrm>
+            <a:off x="5411261" y="702307"/>
+            <a:ext cx="760614" cy="276999"/>
+          </a:xfrm>
+          <a:prstGeom prst="rect">
+            <a:avLst/>
+          </a:prstGeom>
+          <a:noFill/>
+        </p:spPr>
+        <p:txBody>
+          <a:bodyPr wrap="square" rtlCol="0">
+            <a:spAutoFit/>
+          </a:bodyPr>
+          <a:lstStyle/>
+          <a:p>
+            <a:r>
+              <a:rPr lang="en-US" sz="1200" dirty="0"/>
+              <a:t>2.048V</a:t>
+            </a:r>
+          </a:p>
+        </p:txBody>
+      </p:sp>
+      <p:sp>
+        <p:nvSpPr>
+          <p:cNvPr id="72" name="TextBox 71">
+            <a:extLst>
+              <a:ext uri="{FF2B5EF4-FFF2-40B4-BE49-F238E27FC236}">
+                <a16:creationId xmlns:a16="http://schemas.microsoft.com/office/drawing/2014/main" id="{7201C09A-7385-48DF-1854-BA4BAF42055D}"/>
+              </a:ext>
+            </a:extLst>
+          </p:cNvPr>
+          <p:cNvSpPr txBox="1"/>
+          <p:nvPr/>
+        </p:nvSpPr>
+        <p:spPr>
+          <a:xfrm>
+            <a:off x="5441677" y="1430736"/>
+            <a:ext cx="760614" cy="276999"/>
+          </a:xfrm>
+          <a:prstGeom prst="rect">
+            <a:avLst/>
+          </a:prstGeom>
+          <a:noFill/>
+        </p:spPr>
+        <p:txBody>
+          <a:bodyPr wrap="square" rtlCol="0">
+            <a:spAutoFit/>
+          </a:bodyPr>
+          <a:lstStyle/>
+          <a:p>
+            <a:r>
+              <a:rPr lang="en-US" sz="1200" dirty="0"/>
+              <a:t>2.048V</a:t>
+            </a:r>
+          </a:p>
+        </p:txBody>
+      </p:sp>
+      <p:sp>
+        <p:nvSpPr>
+          <p:cNvPr id="74" name="TextBox 73">
+            <a:extLst>
+              <a:ext uri="{FF2B5EF4-FFF2-40B4-BE49-F238E27FC236}">
+                <a16:creationId xmlns:a16="http://schemas.microsoft.com/office/drawing/2014/main" id="{D6B18780-3350-2509-23CD-587419A71D36}"/>
+              </a:ext>
+            </a:extLst>
+          </p:cNvPr>
+          <p:cNvSpPr txBox="1"/>
+          <p:nvPr/>
+        </p:nvSpPr>
+        <p:spPr>
+          <a:xfrm>
+            <a:off x="6928121" y="443062"/>
+            <a:ext cx="4379695" cy="369332"/>
+          </a:xfrm>
+          <a:prstGeom prst="rect">
+            <a:avLst/>
+          </a:prstGeom>
+          <a:noFill/>
+        </p:spPr>
+        <p:txBody>
+          <a:bodyPr wrap="square">
+            <a:spAutoFit/>
+          </a:bodyPr>
+          <a:lstStyle/>
+          <a:p>
+            <a:r>
+              <a:rPr lang="en-US" b="1" dirty="0"/>
+              <a:t>ADS115 I2C (two unique addresses) </a:t>
+            </a:r>
+            <a:endParaRPr lang="en-US" dirty="0"/>
+          </a:p>
+        </p:txBody>
+      </p:sp>
+      <p:sp>
+        <p:nvSpPr>
+          <p:cNvPr id="75" name="TextBox 74">
+            <a:extLst>
+              <a:ext uri="{FF2B5EF4-FFF2-40B4-BE49-F238E27FC236}">
+                <a16:creationId xmlns:a16="http://schemas.microsoft.com/office/drawing/2014/main" id="{98262070-1413-3B1A-21B3-C32C3D624051}"/>
+              </a:ext>
+            </a:extLst>
+          </p:cNvPr>
+          <p:cNvSpPr txBox="1"/>
+          <p:nvPr/>
+        </p:nvSpPr>
+        <p:spPr>
+          <a:xfrm>
+            <a:off x="6803883" y="1097551"/>
+            <a:ext cx="468272" cy="369332"/>
+          </a:xfrm>
+          <a:prstGeom prst="rect">
+            <a:avLst/>
+          </a:prstGeom>
+          <a:noFill/>
+        </p:spPr>
+        <p:txBody>
+          <a:bodyPr wrap="square" rtlCol="0">
+            <a:spAutoFit/>
+          </a:bodyPr>
+          <a:lstStyle/>
+          <a:p>
+            <a:r>
+              <a:rPr lang="en-US" dirty="0">
+                <a:solidFill>
+                  <a:schemeClr val="bg1"/>
+                </a:solidFill>
+              </a:rPr>
+              <a:t>x 2</a:t>
+            </a:r>
+          </a:p>
+        </p:txBody>
+      </p:sp>
+      <p:cxnSp>
+        <p:nvCxnSpPr>
+          <p:cNvPr id="76" name="Straight Connector 75">
+            <a:extLst>
+              <a:ext uri="{FF2B5EF4-FFF2-40B4-BE49-F238E27FC236}">
+                <a16:creationId xmlns:a16="http://schemas.microsoft.com/office/drawing/2014/main" id="{43221BB7-653A-9761-D33C-95509937C027}"/>
+              </a:ext>
+            </a:extLst>
+          </p:cNvPr>
+          <p:cNvCxnSpPr>
+            <a:cxnSpLocks/>
+          </p:cNvCxnSpPr>
+          <p:nvPr/>
+        </p:nvCxnSpPr>
+        <p:spPr>
+          <a:xfrm>
+            <a:off x="7546428" y="1282217"/>
+            <a:ext cx="1240138" cy="0"/>
+          </a:xfrm>
+          <a:prstGeom prst="line">
+            <a:avLst/>
+          </a:prstGeom>
+        </p:spPr>
+        <p:style>
+          <a:lnRef idx="1">
+            <a:schemeClr val="accent1"/>
+          </a:lnRef>
+          <a:fillRef idx="0">
+            <a:schemeClr val="accent1"/>
+          </a:fillRef>
+          <a:effectRef idx="0">
+            <a:schemeClr val="accent1"/>
+          </a:effectRef>
+          <a:fontRef idx="minor">
+            <a:schemeClr val="tx1"/>
+          </a:fontRef>
+        </p:style>
+      </p:cxnSp>
+      <p:sp>
+        <p:nvSpPr>
+          <p:cNvPr id="78" name="Isosceles Triangle 77">
+            <a:extLst>
+              <a:ext uri="{FF2B5EF4-FFF2-40B4-BE49-F238E27FC236}">
+                <a16:creationId xmlns:a16="http://schemas.microsoft.com/office/drawing/2014/main" id="{64CC42E5-97C5-3EA1-A38F-A47D8707FB80}"/>
+              </a:ext>
+            </a:extLst>
+          </p:cNvPr>
+          <p:cNvSpPr/>
+          <p:nvPr/>
+        </p:nvSpPr>
+        <p:spPr>
+          <a:xfrm rot="5400000">
+            <a:off x="6423558" y="2307627"/>
+            <a:ext cx="1418928" cy="955406"/>
+          </a:xfrm>
+          <a:prstGeom prst="triangle">
+            <a:avLst/>
+          </a:prstGeom>
+        </p:spPr>
+        <p:style>
+          <a:lnRef idx="2">
+            <a:schemeClr val="accent1">
+              <a:shade val="15000"/>
+            </a:schemeClr>
+          </a:lnRef>
+          <a:fillRef idx="1">
+            <a:schemeClr val="accent1"/>
+          </a:fillRef>
+          <a:effectRef idx="0">
+            <a:schemeClr val="accent1"/>
+          </a:effectRef>
+          <a:fontRef idx="minor">
+            <a:schemeClr val="lt1"/>
+          </a:fontRef>
+        </p:style>
+        <p:txBody>
+          <a:bodyPr rtlCol="0" anchor="ctr"/>
+          <a:lstStyle/>
+          <a:p>
+            <a:pPr algn="ctr"/>
+            <a:endParaRPr lang="en-US"/>
+          </a:p>
+        </p:txBody>
+      </p:sp>
+      <p:sp>
+        <p:nvSpPr>
+          <p:cNvPr id="79" name="TextBox 78">
+            <a:extLst>
+              <a:ext uri="{FF2B5EF4-FFF2-40B4-BE49-F238E27FC236}">
+                <a16:creationId xmlns:a16="http://schemas.microsoft.com/office/drawing/2014/main" id="{7EA98148-E0BB-A5D0-27E2-60E49C3F95A5}"/>
+              </a:ext>
+            </a:extLst>
+          </p:cNvPr>
+          <p:cNvSpPr txBox="1"/>
+          <p:nvPr/>
+        </p:nvSpPr>
+        <p:spPr>
+          <a:xfrm>
+            <a:off x="6795019" y="2600664"/>
+            <a:ext cx="468272" cy="369332"/>
+          </a:xfrm>
+          <a:prstGeom prst="rect">
+            <a:avLst/>
+          </a:prstGeom>
+          <a:noFill/>
+        </p:spPr>
+        <p:txBody>
+          <a:bodyPr wrap="square" rtlCol="0">
+            <a:spAutoFit/>
+          </a:bodyPr>
+          <a:lstStyle/>
+          <a:p>
+            <a:r>
+              <a:rPr lang="en-US" dirty="0">
+                <a:solidFill>
+                  <a:schemeClr val="bg1"/>
+                </a:solidFill>
+              </a:rPr>
+              <a:t>x 2</a:t>
+            </a:r>
+          </a:p>
+        </p:txBody>
+      </p:sp>
+      <p:cxnSp>
+        <p:nvCxnSpPr>
+          <p:cNvPr id="80" name="Straight Connector 79">
+            <a:extLst>
+              <a:ext uri="{FF2B5EF4-FFF2-40B4-BE49-F238E27FC236}">
+                <a16:creationId xmlns:a16="http://schemas.microsoft.com/office/drawing/2014/main" id="{EF2ECA01-CCB5-2605-6A57-55B9B85DD2CA}"/>
+              </a:ext>
+            </a:extLst>
+          </p:cNvPr>
+          <p:cNvCxnSpPr>
+            <a:cxnSpLocks/>
+          </p:cNvCxnSpPr>
+          <p:nvPr/>
+        </p:nvCxnSpPr>
+        <p:spPr>
+          <a:xfrm>
+            <a:off x="5036203" y="2499337"/>
+            <a:ext cx="1674201" cy="18146"/>
+          </a:xfrm>
+          <a:prstGeom prst="line">
+            <a:avLst/>
+          </a:prstGeom>
+        </p:spPr>
+        <p:style>
+          <a:lnRef idx="1">
+            <a:schemeClr val="accent1"/>
+          </a:lnRef>
+          <a:fillRef idx="0">
+            <a:schemeClr val="accent1"/>
+          </a:fillRef>
+          <a:effectRef idx="0">
+            <a:schemeClr val="accent1"/>
+          </a:effectRef>
+          <a:fontRef idx="minor">
+            <a:schemeClr val="tx1"/>
+          </a:fontRef>
+        </p:style>
+      </p:cxnSp>
+      <p:cxnSp>
+        <p:nvCxnSpPr>
+          <p:cNvPr id="81" name="Straight Connector 80">
+            <a:extLst>
+              <a:ext uri="{FF2B5EF4-FFF2-40B4-BE49-F238E27FC236}">
+                <a16:creationId xmlns:a16="http://schemas.microsoft.com/office/drawing/2014/main" id="{B974C9D6-191F-D360-0BEB-B96B92C3B210}"/>
+              </a:ext>
+            </a:extLst>
+          </p:cNvPr>
+          <p:cNvCxnSpPr>
+            <a:cxnSpLocks/>
+          </p:cNvCxnSpPr>
+          <p:nvPr/>
+        </p:nvCxnSpPr>
+        <p:spPr>
+          <a:xfrm>
+            <a:off x="5091380" y="3274990"/>
+            <a:ext cx="1674201" cy="18146"/>
+          </a:xfrm>
+          <a:prstGeom prst="line">
+            <a:avLst/>
+          </a:prstGeom>
+        </p:spPr>
+        <p:style>
+          <a:lnRef idx="1">
+            <a:schemeClr val="accent1"/>
+          </a:lnRef>
+          <a:fillRef idx="0">
+            <a:schemeClr val="accent1"/>
+          </a:fillRef>
+          <a:effectRef idx="0">
+            <a:schemeClr val="accent1"/>
+          </a:effectRef>
+          <a:fontRef idx="minor">
+            <a:schemeClr val="tx1"/>
+          </a:fontRef>
+        </p:style>
+      </p:cxnSp>
+      <p:cxnSp>
+        <p:nvCxnSpPr>
+          <p:cNvPr id="82" name="Straight Connector 81">
+            <a:extLst>
+              <a:ext uri="{FF2B5EF4-FFF2-40B4-BE49-F238E27FC236}">
+                <a16:creationId xmlns:a16="http://schemas.microsoft.com/office/drawing/2014/main" id="{EB32E966-8B0A-BA48-7D99-167D95FD9244}"/>
+              </a:ext>
+            </a:extLst>
+          </p:cNvPr>
+          <p:cNvCxnSpPr>
+            <a:cxnSpLocks/>
+          </p:cNvCxnSpPr>
+          <p:nvPr/>
+        </p:nvCxnSpPr>
+        <p:spPr>
+          <a:xfrm>
+            <a:off x="6042634" y="2961898"/>
+            <a:ext cx="622654" cy="0"/>
+          </a:xfrm>
+          <a:prstGeom prst="line">
+            <a:avLst/>
+          </a:prstGeom>
+        </p:spPr>
+        <p:style>
+          <a:lnRef idx="1">
+            <a:schemeClr val="accent1"/>
+          </a:lnRef>
+          <a:fillRef idx="0">
+            <a:schemeClr val="accent1"/>
+          </a:fillRef>
+          <a:effectRef idx="0">
+            <a:schemeClr val="accent1"/>
+          </a:effectRef>
+          <a:fontRef idx="minor">
+            <a:schemeClr val="tx1"/>
+          </a:fontRef>
+        </p:style>
+      </p:cxnSp>
+      <p:cxnSp>
+        <p:nvCxnSpPr>
+          <p:cNvPr id="83" name="Straight Connector 82">
+            <a:extLst>
+              <a:ext uri="{FF2B5EF4-FFF2-40B4-BE49-F238E27FC236}">
+                <a16:creationId xmlns:a16="http://schemas.microsoft.com/office/drawing/2014/main" id="{9E3C70BA-F811-896B-EBE0-D1254F07A8A3}"/>
+              </a:ext>
+            </a:extLst>
+          </p:cNvPr>
+          <p:cNvCxnSpPr>
+            <a:cxnSpLocks/>
+          </p:cNvCxnSpPr>
+          <p:nvPr/>
+        </p:nvCxnSpPr>
+        <p:spPr>
+          <a:xfrm>
+            <a:off x="6042634" y="2183334"/>
+            <a:ext cx="671396" cy="0"/>
+          </a:xfrm>
+          <a:prstGeom prst="line">
+            <a:avLst/>
+          </a:prstGeom>
+        </p:spPr>
+        <p:style>
+          <a:lnRef idx="1">
+            <a:schemeClr val="accent1"/>
+          </a:lnRef>
+          <a:fillRef idx="0">
+            <a:schemeClr val="accent1"/>
+          </a:fillRef>
+          <a:effectRef idx="0">
+            <a:schemeClr val="accent1"/>
+          </a:effectRef>
+          <a:fontRef idx="minor">
+            <a:schemeClr val="tx1"/>
+          </a:fontRef>
+        </p:style>
+      </p:cxnSp>
+      <p:sp>
+        <p:nvSpPr>
+          <p:cNvPr id="84" name="TextBox 83">
+            <a:extLst>
+              <a:ext uri="{FF2B5EF4-FFF2-40B4-BE49-F238E27FC236}">
+                <a16:creationId xmlns:a16="http://schemas.microsoft.com/office/drawing/2014/main" id="{46279F29-E108-DE07-4976-641B84D9E960}"/>
+              </a:ext>
+            </a:extLst>
+          </p:cNvPr>
+          <p:cNvSpPr txBox="1"/>
+          <p:nvPr/>
+        </p:nvSpPr>
+        <p:spPr>
+          <a:xfrm>
+            <a:off x="5419643" y="2016969"/>
+            <a:ext cx="783720" cy="276999"/>
+          </a:xfrm>
+          <a:prstGeom prst="rect">
+            <a:avLst/>
+          </a:prstGeom>
+          <a:noFill/>
+        </p:spPr>
+        <p:txBody>
+          <a:bodyPr wrap="square" rtlCol="0">
+            <a:spAutoFit/>
+          </a:bodyPr>
+          <a:lstStyle/>
+          <a:p>
+            <a:r>
+              <a:rPr lang="en-US" sz="1200" dirty="0"/>
+              <a:t>2.048V</a:t>
+            </a:r>
+          </a:p>
+        </p:txBody>
+      </p:sp>
+      <p:sp>
+        <p:nvSpPr>
+          <p:cNvPr id="85" name="TextBox 84">
+            <a:extLst>
+              <a:ext uri="{FF2B5EF4-FFF2-40B4-BE49-F238E27FC236}">
+                <a16:creationId xmlns:a16="http://schemas.microsoft.com/office/drawing/2014/main" id="{B52D2CD6-4091-9A53-55DA-A075A7985496}"/>
+              </a:ext>
+            </a:extLst>
+          </p:cNvPr>
+          <p:cNvSpPr txBox="1"/>
+          <p:nvPr/>
+        </p:nvSpPr>
+        <p:spPr>
+          <a:xfrm>
+            <a:off x="5450059" y="2828164"/>
+            <a:ext cx="783720" cy="276999"/>
+          </a:xfrm>
+          <a:prstGeom prst="rect">
+            <a:avLst/>
+          </a:prstGeom>
+          <a:noFill/>
+        </p:spPr>
+        <p:txBody>
+          <a:bodyPr wrap="square" rtlCol="0">
+            <a:spAutoFit/>
+          </a:bodyPr>
+          <a:lstStyle/>
+          <a:p>
+            <a:r>
+              <a:rPr lang="en-US" sz="1200" dirty="0"/>
+              <a:t>2.048V</a:t>
+            </a:r>
+          </a:p>
+        </p:txBody>
+      </p:sp>
+      <p:cxnSp>
+        <p:nvCxnSpPr>
+          <p:cNvPr id="91" name="Straight Connector 90">
+            <a:extLst>
+              <a:ext uri="{FF2B5EF4-FFF2-40B4-BE49-F238E27FC236}">
+                <a16:creationId xmlns:a16="http://schemas.microsoft.com/office/drawing/2014/main" id="{9509BA30-7370-33DF-24A0-D048BF89ABC9}"/>
+              </a:ext>
+            </a:extLst>
+          </p:cNvPr>
+          <p:cNvCxnSpPr/>
+          <p:nvPr/>
+        </p:nvCxnSpPr>
+        <p:spPr>
+          <a:xfrm>
+            <a:off x="6034252" y="868672"/>
+            <a:ext cx="0" cy="3384076"/>
+          </a:xfrm>
+          <a:prstGeom prst="line">
+            <a:avLst/>
+          </a:prstGeom>
+        </p:spPr>
+        <p:style>
+          <a:lnRef idx="1">
+            <a:schemeClr val="accent1"/>
+          </a:lnRef>
+          <a:fillRef idx="0">
+            <a:schemeClr val="accent1"/>
+          </a:fillRef>
+          <a:effectRef idx="0">
+            <a:schemeClr val="accent1"/>
+          </a:effectRef>
+          <a:fontRef idx="minor">
+            <a:schemeClr val="tx1"/>
+          </a:fontRef>
+        </p:style>
+      </p:cxnSp>
+      <p:sp>
+        <p:nvSpPr>
+          <p:cNvPr id="92" name="Rectangle 91">
+            <a:extLst>
+              <a:ext uri="{FF2B5EF4-FFF2-40B4-BE49-F238E27FC236}">
+                <a16:creationId xmlns:a16="http://schemas.microsoft.com/office/drawing/2014/main" id="{4D2C9E58-0381-0396-A4FB-45A0FAD0F53C}"/>
+              </a:ext>
+            </a:extLst>
+          </p:cNvPr>
+          <p:cNvSpPr/>
+          <p:nvPr/>
+        </p:nvSpPr>
+        <p:spPr>
+          <a:xfrm>
+            <a:off x="5776582" y="4243657"/>
+            <a:ext cx="457197" cy="369329"/>
+          </a:xfrm>
+          <a:prstGeom prst="rect">
+            <a:avLst/>
+          </a:prstGeom>
+          <a:solidFill>
+            <a:srgbClr val="92D050"/>
+          </a:solidFill>
+        </p:spPr>
+        <p:style>
+          <a:lnRef idx="2">
+            <a:schemeClr val="accent1">
+              <a:shade val="15000"/>
+            </a:schemeClr>
+          </a:lnRef>
+          <a:fillRef idx="1">
+            <a:schemeClr val="accent1"/>
+          </a:fillRef>
+          <a:effectRef idx="0">
+            <a:schemeClr val="accent1"/>
+          </a:effectRef>
+          <a:fontRef idx="minor">
+            <a:schemeClr val="lt1"/>
+          </a:fontRef>
+        </p:style>
+        <p:txBody>
+          <a:bodyPr rtlCol="0" anchor="ctr"/>
+          <a:lstStyle/>
+          <a:p>
+            <a:pPr algn="ctr"/>
+            <a:endParaRPr lang="en-US"/>
+          </a:p>
+        </p:txBody>
+      </p:sp>
+      <p:sp>
+        <p:nvSpPr>
+          <p:cNvPr id="93" name="TextBox 92">
+            <a:extLst>
+              <a:ext uri="{FF2B5EF4-FFF2-40B4-BE49-F238E27FC236}">
+                <a16:creationId xmlns:a16="http://schemas.microsoft.com/office/drawing/2014/main" id="{F9A08460-149C-B9E6-645D-BF7F78FBD7AA}"/>
+              </a:ext>
+            </a:extLst>
+          </p:cNvPr>
+          <p:cNvSpPr txBox="1"/>
+          <p:nvPr/>
+        </p:nvSpPr>
+        <p:spPr>
+          <a:xfrm>
+            <a:off x="4741434" y="4683550"/>
+            <a:ext cx="3184743" cy="307777"/>
+          </a:xfrm>
+          <a:prstGeom prst="rect">
+            <a:avLst/>
+          </a:prstGeom>
+          <a:noFill/>
+        </p:spPr>
+        <p:txBody>
+          <a:bodyPr wrap="square" rtlCol="0">
+            <a:spAutoFit/>
+          </a:bodyPr>
+          <a:lstStyle/>
+          <a:p>
+            <a:r>
+              <a:rPr lang="en-US" sz="1400" b="1" dirty="0"/>
+              <a:t>2.048V ref (LM4040 or MAX6070)</a:t>
+            </a:r>
+            <a:endParaRPr lang="en-US" sz="1400" dirty="0"/>
+          </a:p>
+        </p:txBody>
+      </p:sp>
+      <p:cxnSp>
+        <p:nvCxnSpPr>
+          <p:cNvPr id="94" name="Straight Connector 93">
+            <a:extLst>
+              <a:ext uri="{FF2B5EF4-FFF2-40B4-BE49-F238E27FC236}">
+                <a16:creationId xmlns:a16="http://schemas.microsoft.com/office/drawing/2014/main" id="{70A7A265-D93C-D1D5-E811-08AA54604F0C}"/>
+              </a:ext>
+            </a:extLst>
+          </p:cNvPr>
+          <p:cNvCxnSpPr>
+            <a:cxnSpLocks/>
+            <a:stCxn id="78" idx="0"/>
+          </p:cNvCxnSpPr>
+          <p:nvPr/>
+        </p:nvCxnSpPr>
+        <p:spPr>
+          <a:xfrm>
+            <a:off x="7610725" y="2785330"/>
+            <a:ext cx="1201948" cy="3051"/>
+          </a:xfrm>
+          <a:prstGeom prst="line">
+            <a:avLst/>
+          </a:prstGeom>
+        </p:spPr>
+        <p:style>
+          <a:lnRef idx="1">
+            <a:schemeClr val="accent1"/>
+          </a:lnRef>
+          <a:fillRef idx="0">
+            <a:schemeClr val="accent1"/>
+          </a:fillRef>
+          <a:effectRef idx="0">
+            <a:schemeClr val="accent1"/>
+          </a:effectRef>
+          <a:fontRef idx="minor">
+            <a:schemeClr val="tx1"/>
+          </a:fontRef>
+        </p:style>
+      </p:cxnSp>
+      <p:sp>
+        <p:nvSpPr>
+          <p:cNvPr id="95" name="Rectangle 94">
+            <a:extLst>
+              <a:ext uri="{FF2B5EF4-FFF2-40B4-BE49-F238E27FC236}">
+                <a16:creationId xmlns:a16="http://schemas.microsoft.com/office/drawing/2014/main" id="{3DB8387C-0B5B-0627-872C-9F968FE19231}"/>
+              </a:ext>
+            </a:extLst>
+          </p:cNvPr>
+          <p:cNvSpPr/>
+          <p:nvPr/>
+        </p:nvSpPr>
+        <p:spPr>
+          <a:xfrm>
+            <a:off x="9776508" y="974199"/>
+            <a:ext cx="1288212" cy="1957375"/>
+          </a:xfrm>
+          <a:prstGeom prst="rect">
+            <a:avLst/>
+          </a:prstGeom>
+          <a:solidFill>
+            <a:srgbClr val="00B050"/>
+          </a:solidFill>
+        </p:spPr>
+        <p:style>
+          <a:lnRef idx="2">
+            <a:schemeClr val="accent1">
+              <a:shade val="15000"/>
+            </a:schemeClr>
+          </a:lnRef>
+          <a:fillRef idx="1">
+            <a:schemeClr val="accent1"/>
+          </a:fillRef>
+          <a:effectRef idx="0">
+            <a:schemeClr val="accent1"/>
+          </a:effectRef>
+          <a:fontRef idx="minor">
+            <a:schemeClr val="lt1"/>
+          </a:fontRef>
+        </p:style>
+        <p:txBody>
+          <a:bodyPr rtlCol="0" anchor="ctr"/>
+          <a:lstStyle/>
+          <a:p>
+            <a:pPr algn="ctr"/>
+            <a:endParaRPr lang="en-US"/>
+          </a:p>
+        </p:txBody>
+      </p:sp>
+      <p:sp>
+        <p:nvSpPr>
+          <p:cNvPr id="96" name="Rectangle 95">
+            <a:extLst>
+              <a:ext uri="{FF2B5EF4-FFF2-40B4-BE49-F238E27FC236}">
+                <a16:creationId xmlns:a16="http://schemas.microsoft.com/office/drawing/2014/main" id="{BEABF460-986E-0D9E-265C-DF8810A93ABE}"/>
+              </a:ext>
+            </a:extLst>
+          </p:cNvPr>
+          <p:cNvSpPr/>
+          <p:nvPr/>
+        </p:nvSpPr>
+        <p:spPr>
+          <a:xfrm>
+            <a:off x="8557969" y="3494794"/>
+            <a:ext cx="457195" cy="466340"/>
+          </a:xfrm>
+          <a:prstGeom prst="rect">
+            <a:avLst/>
+          </a:prstGeom>
+        </p:spPr>
+        <p:style>
+          <a:lnRef idx="2">
+            <a:schemeClr val="accent1">
+              <a:shade val="15000"/>
+            </a:schemeClr>
+          </a:lnRef>
+          <a:fillRef idx="1">
+            <a:schemeClr val="accent1"/>
+          </a:fillRef>
+          <a:effectRef idx="0">
+            <a:schemeClr val="accent1"/>
+          </a:effectRef>
+          <a:fontRef idx="minor">
+            <a:schemeClr val="lt1"/>
+          </a:fontRef>
+        </p:style>
+        <p:txBody>
+          <a:bodyPr rtlCol="0" anchor="ctr"/>
+          <a:lstStyle/>
+          <a:p>
+            <a:pPr algn="ctr"/>
+            <a:endParaRPr lang="en-US"/>
+          </a:p>
+        </p:txBody>
+      </p:sp>
+      <p:sp>
+        <p:nvSpPr>
+          <p:cNvPr id="97" name="Rectangle 96">
+            <a:extLst>
+              <a:ext uri="{FF2B5EF4-FFF2-40B4-BE49-F238E27FC236}">
+                <a16:creationId xmlns:a16="http://schemas.microsoft.com/office/drawing/2014/main" id="{BDFFAFC6-5A56-BC4D-F878-865AEE369167}"/>
+              </a:ext>
+            </a:extLst>
+          </p:cNvPr>
+          <p:cNvSpPr/>
+          <p:nvPr/>
+        </p:nvSpPr>
+        <p:spPr>
+          <a:xfrm>
+            <a:off x="9158451" y="3494794"/>
+            <a:ext cx="457195" cy="466340"/>
+          </a:xfrm>
+          <a:prstGeom prst="rect">
+            <a:avLst/>
+          </a:prstGeom>
+        </p:spPr>
+        <p:style>
+          <a:lnRef idx="2">
+            <a:schemeClr val="accent1">
+              <a:shade val="15000"/>
+            </a:schemeClr>
+          </a:lnRef>
+          <a:fillRef idx="1">
+            <a:schemeClr val="accent1"/>
+          </a:fillRef>
+          <a:effectRef idx="0">
+            <a:schemeClr val="accent1"/>
+          </a:effectRef>
+          <a:fontRef idx="minor">
+            <a:schemeClr val="lt1"/>
+          </a:fontRef>
+        </p:style>
+        <p:txBody>
+          <a:bodyPr rtlCol="0" anchor="ctr"/>
+          <a:lstStyle/>
+          <a:p>
+            <a:pPr algn="ctr"/>
+            <a:endParaRPr lang="en-US"/>
+          </a:p>
+        </p:txBody>
+      </p:sp>
+      <p:cxnSp>
+        <p:nvCxnSpPr>
+          <p:cNvPr id="98" name="Straight Connector 97">
+            <a:extLst>
+              <a:ext uri="{FF2B5EF4-FFF2-40B4-BE49-F238E27FC236}">
+                <a16:creationId xmlns:a16="http://schemas.microsoft.com/office/drawing/2014/main" id="{0FCA60CA-4AEE-0D9A-A1C7-2542A6496810}"/>
+              </a:ext>
+            </a:extLst>
+          </p:cNvPr>
+          <p:cNvCxnSpPr>
+            <a:cxnSpLocks/>
+          </p:cNvCxnSpPr>
+          <p:nvPr/>
+        </p:nvCxnSpPr>
+        <p:spPr>
+          <a:xfrm flipV="1">
+            <a:off x="8786566" y="1282217"/>
+            <a:ext cx="0" cy="2688911"/>
+          </a:xfrm>
+          <a:prstGeom prst="line">
+            <a:avLst/>
+          </a:prstGeom>
+        </p:spPr>
+        <p:style>
+          <a:lnRef idx="1">
+            <a:schemeClr val="accent1"/>
+          </a:lnRef>
+          <a:fillRef idx="0">
+            <a:schemeClr val="accent1"/>
+          </a:fillRef>
+          <a:effectRef idx="0">
+            <a:schemeClr val="accent1"/>
+          </a:effectRef>
+          <a:fontRef idx="minor">
+            <a:schemeClr val="tx1"/>
+          </a:fontRef>
+        </p:style>
+      </p:cxnSp>
+      <p:cxnSp>
+        <p:nvCxnSpPr>
+          <p:cNvPr id="99" name="Straight Connector 98">
+            <a:extLst>
+              <a:ext uri="{FF2B5EF4-FFF2-40B4-BE49-F238E27FC236}">
+                <a16:creationId xmlns:a16="http://schemas.microsoft.com/office/drawing/2014/main" id="{B22B85DC-4219-FBCE-AF3E-39C18D3E185D}"/>
+              </a:ext>
+            </a:extLst>
+          </p:cNvPr>
+          <p:cNvCxnSpPr>
+            <a:cxnSpLocks/>
+            <a:stCxn id="97" idx="0"/>
+          </p:cNvCxnSpPr>
+          <p:nvPr/>
+        </p:nvCxnSpPr>
+        <p:spPr>
+          <a:xfrm flipH="1" flipV="1">
+            <a:off x="8761856" y="2777072"/>
+            <a:ext cx="625193" cy="717722"/>
+          </a:xfrm>
+          <a:prstGeom prst="line">
+            <a:avLst/>
+          </a:prstGeom>
+        </p:spPr>
+        <p:style>
+          <a:lnRef idx="1">
+            <a:schemeClr val="accent1"/>
+          </a:lnRef>
+          <a:fillRef idx="0">
+            <a:schemeClr val="accent1"/>
+          </a:fillRef>
+          <a:effectRef idx="0">
+            <a:schemeClr val="accent1"/>
+          </a:effectRef>
+          <a:fontRef idx="minor">
+            <a:schemeClr val="tx1"/>
+          </a:fontRef>
+        </p:style>
+      </p:cxnSp>
+      <p:sp>
+        <p:nvSpPr>
+          <p:cNvPr id="101" name="TextBox 100">
+            <a:extLst>
+              <a:ext uri="{FF2B5EF4-FFF2-40B4-BE49-F238E27FC236}">
+                <a16:creationId xmlns:a16="http://schemas.microsoft.com/office/drawing/2014/main" id="{78CE7EF9-134A-AA08-2DE8-804649CD8561}"/>
+              </a:ext>
+            </a:extLst>
+          </p:cNvPr>
+          <p:cNvSpPr txBox="1"/>
+          <p:nvPr/>
+        </p:nvSpPr>
+        <p:spPr>
+          <a:xfrm>
+            <a:off x="8445300" y="3971128"/>
+            <a:ext cx="734746" cy="369332"/>
+          </a:xfrm>
+          <a:prstGeom prst="rect">
+            <a:avLst/>
+          </a:prstGeom>
+          <a:noFill/>
+        </p:spPr>
+        <p:txBody>
+          <a:bodyPr wrap="square" rtlCol="0">
+            <a:spAutoFit/>
+          </a:bodyPr>
+          <a:lstStyle/>
+          <a:p>
+            <a:r>
+              <a:rPr lang="en-US" b="1" dirty="0"/>
+              <a:t>IMU</a:t>
+            </a:r>
+          </a:p>
+        </p:txBody>
+      </p:sp>
+      <p:sp>
+        <p:nvSpPr>
+          <p:cNvPr id="102" name="TextBox 101">
+            <a:extLst>
+              <a:ext uri="{FF2B5EF4-FFF2-40B4-BE49-F238E27FC236}">
+                <a16:creationId xmlns:a16="http://schemas.microsoft.com/office/drawing/2014/main" id="{552E9F1D-2719-4AFA-4BA7-F36D051D5902}"/>
+              </a:ext>
+            </a:extLst>
+          </p:cNvPr>
+          <p:cNvSpPr txBox="1"/>
+          <p:nvPr/>
+        </p:nvSpPr>
+        <p:spPr>
+          <a:xfrm>
+            <a:off x="9110883" y="3966077"/>
+            <a:ext cx="3111333" cy="369332"/>
+          </a:xfrm>
+          <a:prstGeom prst="rect">
+            <a:avLst/>
+          </a:prstGeom>
+          <a:noFill/>
+        </p:spPr>
+        <p:txBody>
+          <a:bodyPr wrap="square" rtlCol="0">
+            <a:spAutoFit/>
+          </a:bodyPr>
+          <a:lstStyle/>
+          <a:p>
+            <a:r>
+              <a:rPr lang="en-US" b="1" dirty="0"/>
+              <a:t>IMU (two unique addresses)</a:t>
+            </a:r>
+          </a:p>
+        </p:txBody>
+      </p:sp>
+      <p:sp>
+        <p:nvSpPr>
+          <p:cNvPr id="105" name="TextBox 104">
+            <a:extLst>
+              <a:ext uri="{FF2B5EF4-FFF2-40B4-BE49-F238E27FC236}">
+                <a16:creationId xmlns:a16="http://schemas.microsoft.com/office/drawing/2014/main" id="{68051812-AD1F-B357-C89A-C9723BFB5C2B}"/>
+              </a:ext>
+            </a:extLst>
+          </p:cNvPr>
+          <p:cNvSpPr txBox="1"/>
+          <p:nvPr/>
+        </p:nvSpPr>
+        <p:spPr>
+          <a:xfrm>
+            <a:off x="9776508" y="1705689"/>
+            <a:ext cx="1331366" cy="369332"/>
+          </a:xfrm>
+          <a:prstGeom prst="rect">
+            <a:avLst/>
+          </a:prstGeom>
+          <a:noFill/>
+        </p:spPr>
+        <p:txBody>
+          <a:bodyPr wrap="square" rtlCol="0">
+            <a:spAutoFit/>
+          </a:bodyPr>
+          <a:lstStyle/>
+          <a:p>
+            <a:r>
+              <a:rPr lang="en-US" b="1" dirty="0" err="1"/>
+              <a:t>Rasberry</a:t>
+            </a:r>
+            <a:r>
+              <a:rPr lang="en-US" b="1" dirty="0"/>
+              <a:t> Pi</a:t>
+            </a:r>
+          </a:p>
+        </p:txBody>
+      </p:sp>
+      <p:cxnSp>
+        <p:nvCxnSpPr>
+          <p:cNvPr id="111" name="Straight Connector 110">
+            <a:extLst>
+              <a:ext uri="{FF2B5EF4-FFF2-40B4-BE49-F238E27FC236}">
+                <a16:creationId xmlns:a16="http://schemas.microsoft.com/office/drawing/2014/main" id="{24C3E237-8042-67EA-ED9D-016668DD088C}"/>
+              </a:ext>
+            </a:extLst>
+          </p:cNvPr>
+          <p:cNvCxnSpPr>
+            <a:cxnSpLocks/>
+          </p:cNvCxnSpPr>
+          <p:nvPr/>
+        </p:nvCxnSpPr>
+        <p:spPr>
+          <a:xfrm>
+            <a:off x="8761856" y="2089632"/>
+            <a:ext cx="1014652" cy="45"/>
+          </a:xfrm>
+          <a:prstGeom prst="line">
+            <a:avLst/>
+          </a:prstGeom>
+        </p:spPr>
+        <p:style>
+          <a:lnRef idx="1">
+            <a:schemeClr val="accent1"/>
+          </a:lnRef>
+          <a:fillRef idx="0">
+            <a:schemeClr val="accent1"/>
+          </a:fillRef>
+          <a:effectRef idx="0">
+            <a:schemeClr val="accent1"/>
+          </a:effectRef>
+          <a:fontRef idx="minor">
+            <a:schemeClr val="tx1"/>
+          </a:fontRef>
+        </p:style>
+      </p:cxnSp>
+      <p:sp>
+        <p:nvSpPr>
+          <p:cNvPr id="114" name="TextBox 113">
+            <a:extLst>
+              <a:ext uri="{FF2B5EF4-FFF2-40B4-BE49-F238E27FC236}">
+                <a16:creationId xmlns:a16="http://schemas.microsoft.com/office/drawing/2014/main" id="{8DAF8A4C-F499-9B68-1EA8-1CE8E34C47DF}"/>
+              </a:ext>
+            </a:extLst>
+          </p:cNvPr>
+          <p:cNvSpPr txBox="1"/>
+          <p:nvPr/>
+        </p:nvSpPr>
+        <p:spPr>
+          <a:xfrm>
+            <a:off x="9061583" y="1786136"/>
+            <a:ext cx="554063" cy="369332"/>
+          </a:xfrm>
+          <a:prstGeom prst="rect">
+            <a:avLst/>
+          </a:prstGeom>
+          <a:noFill/>
+        </p:spPr>
+        <p:txBody>
+          <a:bodyPr wrap="square">
+            <a:spAutoFit/>
+          </a:bodyPr>
+          <a:lstStyle/>
+          <a:p>
+            <a:r>
+              <a:rPr lang="en-US" b="1" dirty="0"/>
+              <a:t>I2C</a:t>
+            </a:r>
+            <a:endParaRPr lang="en-US" dirty="0"/>
+          </a:p>
+        </p:txBody>
+      </p:sp>
+    </p:spTree>
+    <p:extLst>
+      <p:ext uri="{BB962C8B-B14F-4D97-AF65-F5344CB8AC3E}">
+        <p14:creationId xmlns:p14="http://schemas.microsoft.com/office/powerpoint/2010/main" val="876017896"/>
+      </p:ext>
+    </p:extLst>
+  </p:cSld>
+  <p:clrMapOvr>
+    <a:masterClrMapping/>
+  </p:clrMapOvr>
+</p:sld>
+</file>
+
 <file path=ppt/theme/theme1.xml><?xml version="1.0" encoding="utf-8"?>
 <a:theme xmlns:a="http://schemas.openxmlformats.org/drawingml/2006/main" name="Office Theme">
   <a:themeElements>

</xml_diff>